<commit_message>
changes for review tomorrow
</commit_message>
<xml_diff>
--- a/docs/project_management/external_meetings/Pre Alpha Release Intro Slides.pptx
+++ b/docs/project_management/external_meetings/Pre Alpha Release Intro Slides.pptx
@@ -12,8 +12,8 @@
     <p:sldId id="257" r:id="rId6"/>
     <p:sldId id="260" r:id="rId7"/>
     <p:sldId id="277" r:id="rId8"/>
-    <p:sldId id="278" r:id="rId9"/>
-    <p:sldId id="274" r:id="rId10"/>
+    <p:sldId id="279" r:id="rId9"/>
+    <p:sldId id="278" r:id="rId10"/>
     <p:sldId id="275" r:id="rId11"/>
   </p:sldIdLst>
   <p:sldSz cx="9144000" cy="6858000" type="screen4x3"/>
@@ -2887,7 +2887,15 @@
             <a:pPr lvl="1"/>
             <a:r>
               <a:rPr lang="en-US" dirty="0" smtClean="0"/>
-              <a:t>For pre-alpha release</a:t>
+              <a:t>For </a:t>
+            </a:r>
+            <a:r>
+              <a:rPr lang="en-US" dirty="0" smtClean="0"/>
+              <a:t>this pre-alpha </a:t>
+            </a:r>
+            <a:r>
+              <a:rPr lang="en-US" dirty="0" smtClean="0"/>
+              <a:t>release</a:t>
             </a:r>
           </a:p>
           <a:p>
@@ -3605,10 +3613,14 @@
           <a:p>
             <a:r>
               <a:rPr lang="en-US" sz="3600" dirty="0" smtClean="0"/>
-              <a:t>How caIntegrator2</a:t>
-            </a:r>
-            <a:r>
-              <a:rPr lang="en-US" dirty="0" smtClean="0"/>
+              <a:t>How </a:t>
+            </a:r>
+            <a:r>
+              <a:rPr lang="en-US" sz="3600" dirty="0" smtClean="0"/>
+              <a:t>caIntegrator2</a:t>
+            </a:r>
+            <a:r>
+              <a:rPr lang="en-US" sz="3600" dirty="0" smtClean="0"/>
               <a:t> </a:t>
             </a:r>
             <a:r>
@@ -7665,11 +7677,7 @@
           <a:p>
             <a:r>
               <a:rPr lang="en-US" sz="3600" dirty="0" smtClean="0"/>
-              <a:t>What caIntegrator2 can </a:t>
-            </a:r>
-            <a:r>
-              <a:rPr lang="en-US" sz="3600" dirty="0" smtClean="0"/>
-              <a:t>do now</a:t>
+              <a:t>What caIntegrator2 can do now</a:t>
             </a:r>
             <a:endParaRPr lang="en-US" sz="3600" dirty="0"/>
           </a:p>
@@ -7694,46 +7702,50 @@
           <a:p>
             <a:r>
               <a:rPr lang="en-US" sz="2000" dirty="0" smtClean="0"/>
-              <a:t>Browse and filter lists of major entities</a:t>
+              <a:t>Deploy studies</a:t>
             </a:r>
           </a:p>
           <a:p>
             <a:pPr lvl="1"/>
             <a:r>
               <a:rPr lang="en-US" sz="2000" dirty="0" smtClean="0"/>
-              <a:t>Subjects</a:t>
-            </a:r>
+              <a:t>mRNA expression data from </a:t>
+            </a:r>
+            <a:r>
+              <a:rPr lang="en-US" sz="2000" dirty="0" err="1" smtClean="0"/>
+              <a:t>caArray</a:t>
+            </a:r>
+            <a:endParaRPr lang="en-US" sz="2000" dirty="0" smtClean="0"/>
           </a:p>
           <a:p>
             <a:pPr lvl="1"/>
             <a:r>
               <a:rPr lang="en-US" sz="2000" dirty="0" smtClean="0"/>
-              <a:t>Samples</a:t>
-            </a:r>
-          </a:p>
-          <a:p>
+              <a:t>Imaging data from NCIA with image annotations from a CSV file</a:t>
+            </a:r>
+          </a:p>
+          <a:p>
+            <a:pPr lvl="1"/>
             <a:r>
               <a:rPr lang="en-US" sz="2000" dirty="0" smtClean="0"/>
-              <a:t>Write complex queries</a:t>
+              <a:t>Clinical data from CSV files</a:t>
+            </a:r>
+          </a:p>
+          <a:p>
+            <a:r>
+              <a:rPr lang="en-US" sz="2000" dirty="0" smtClean="0"/>
+              <a:t>Write </a:t>
+            </a:r>
+            <a:r>
+              <a:rPr lang="en-US" sz="2000" dirty="0" smtClean="0"/>
+              <a:t>complex queries</a:t>
             </a:r>
           </a:p>
           <a:p>
             <a:pPr lvl="1"/>
             <a:r>
               <a:rPr lang="en-US" sz="2000" dirty="0" smtClean="0"/>
-              <a:t>Join across clinical, microarray </a:t>
-            </a:r>
-            <a:r>
-              <a:rPr lang="en-US" sz="2000" dirty="0" smtClean="0"/>
-              <a:t>(mRNA expression) </a:t>
-            </a:r>
-            <a:r>
-              <a:rPr lang="en-US" sz="2000" dirty="0" smtClean="0"/>
-              <a:t>and </a:t>
-            </a:r>
-            <a:r>
-              <a:rPr lang="en-US" sz="2000" dirty="0" smtClean="0"/>
-              <a:t>image data</a:t>
+              <a:t>Join across clinical, microarray (mRNA expression) and image data</a:t>
             </a:r>
           </a:p>
           <a:p>
@@ -7753,13 +7765,8 @@
             <a:pPr lvl="1"/>
             <a:r>
               <a:rPr lang="en-US" sz="2000" dirty="0" smtClean="0"/>
-              <a:t>Kaplan-Meier Survival </a:t>
-            </a:r>
-            <a:r>
-              <a:rPr lang="en-US" sz="2000" dirty="0" smtClean="0"/>
-              <a:t>Curves based on clinical or gene expression data</a:t>
-            </a:r>
-            <a:endParaRPr lang="en-US" sz="2000" dirty="0" smtClean="0"/>
+              <a:t>Kaplan-Meier Survival Curves based on clinical or gene expression data</a:t>
+            </a:r>
           </a:p>
           <a:p>
             <a:pPr lvl="1"/>
@@ -7775,7 +7782,6 @@
               <a:rPr lang="en-US" sz="2000" dirty="0" smtClean="0"/>
               <a:t> for more detailed analysis</a:t>
             </a:r>
-            <a:endParaRPr lang="en-US" sz="2000" dirty="0" smtClean="0"/>
           </a:p>
         </p:txBody>
       </p:sp>
@@ -7851,13 +7857,75 @@
           <a:p>
             <a:r>
               <a:rPr lang="en-US" dirty="0" smtClean="0"/>
-              <a:t>Expanded to incorporate other kinds of array data, such as copy number and polymorphism data</a:t>
-            </a:r>
-          </a:p>
-          <a:p>
+              <a:t>More data types</a:t>
+            </a:r>
+          </a:p>
+          <a:p>
+            <a:pPr lvl="1"/>
             <a:r>
               <a:rPr lang="en-US" dirty="0" smtClean="0"/>
-              <a:t>Enhanced to allow association of clinical, array and imaging data with specific </a:t>
+              <a:t>C</a:t>
+            </a:r>
+            <a:r>
+              <a:rPr lang="en-US" dirty="0" smtClean="0"/>
+              <a:t>opy number</a:t>
+            </a:r>
+          </a:p>
+          <a:p>
+            <a:pPr lvl="1"/>
+            <a:r>
+              <a:rPr lang="en-US" dirty="0" smtClean="0"/>
+              <a:t>Genotype</a:t>
+            </a:r>
+          </a:p>
+          <a:p>
+            <a:pPr lvl="1"/>
+            <a:r>
+              <a:rPr lang="en-US" dirty="0" err="1" smtClean="0"/>
+              <a:t>Methy</a:t>
+            </a:r>
+            <a:r>
+              <a:rPr lang="en-US" dirty="0" err="1" smtClean="0"/>
+              <a:t>lation</a:t>
+            </a:r>
+            <a:endParaRPr lang="en-US" dirty="0" smtClean="0"/>
+          </a:p>
+          <a:p>
+            <a:r>
+              <a:rPr lang="en-US" dirty="0" err="1" smtClean="0"/>
+              <a:t>Timepoints</a:t>
+            </a:r>
+            <a:endParaRPr lang="en-US" dirty="0" smtClean="0"/>
+          </a:p>
+          <a:p>
+            <a:pPr lvl="1"/>
+            <a:r>
+              <a:rPr lang="en-US" dirty="0" smtClean="0"/>
+              <a:t>Cl</a:t>
+            </a:r>
+            <a:r>
+              <a:rPr lang="en-US" dirty="0" smtClean="0"/>
+              <a:t>inical</a:t>
+            </a:r>
+            <a:r>
+              <a:rPr lang="en-US" dirty="0" smtClean="0"/>
+              <a:t>, array and imaging data </a:t>
+            </a:r>
+            <a:r>
+              <a:rPr lang="en-US" dirty="0" smtClean="0"/>
+              <a:t>can be associated with</a:t>
+            </a:r>
+            <a:r>
+              <a:rPr lang="en-US" dirty="0" smtClean="0"/>
+              <a:t> </a:t>
+            </a:r>
+            <a:r>
+              <a:rPr lang="en-US" dirty="0" smtClean="0"/>
+              <a:t>specific </a:t>
+            </a:r>
+            <a:r>
+              <a:rPr lang="en-US" dirty="0" smtClean="0"/>
+              <a:t>study </a:t>
             </a:r>
             <a:r>
               <a:rPr lang="en-US" dirty="0" err="1" smtClean="0"/>
@@ -7865,29 +7933,86 @@
             </a:r>
             <a:r>
               <a:rPr lang="en-US" dirty="0" smtClean="0"/>
-              <a:t> (for instance, </a:t>
+              <a:t> </a:t>
+            </a:r>
+            <a:r>
+              <a:rPr lang="en-US" dirty="0" smtClean="0"/>
+              <a:t>(for instance, </a:t>
+            </a:r>
+            <a:r>
+              <a:rPr lang="en-US" dirty="0" smtClean="0"/>
+              <a:t>‘Time of Diagnosis’ </a:t>
+            </a:r>
+            <a:r>
+              <a:rPr lang="en-US" dirty="0" smtClean="0"/>
+              <a:t>or </a:t>
+            </a:r>
+            <a:r>
+              <a:rPr lang="en-US" dirty="0" smtClean="0"/>
+              <a:t>‘Six Months after Treatment Start’)</a:t>
+            </a:r>
+          </a:p>
+          <a:p>
+            <a:pPr lvl="1"/>
+            <a:r>
+              <a:rPr lang="en-US" dirty="0" smtClean="0"/>
+              <a:t>Queries will be able to operate on data from specific </a:t>
             </a:r>
             <a:r>
               <a:rPr lang="en-US" dirty="0" err="1" smtClean="0"/>
-              <a:t>T</a:t>
+              <a:t>timepoints</a:t>
+            </a:r>
+            <a:endParaRPr lang="en-US" dirty="0" smtClean="0"/>
+          </a:p>
+          <a:p>
+            <a:r>
+              <a:rPr lang="en-US" dirty="0" smtClean="0"/>
+              <a:t>More analysis</a:t>
+            </a:r>
+          </a:p>
+          <a:p>
+            <a:pPr lvl="1"/>
+            <a:r>
+              <a:rPr lang="en-US" dirty="0" smtClean="0"/>
+              <a:t>More seamless integration with </a:t>
             </a:r>
             <a:r>
               <a:rPr lang="en-US" dirty="0" err="1" smtClean="0"/>
-              <a:t>ime_of_Diagnosis</a:t>
-            </a:r>
+              <a:t>GenePattern</a:t>
+            </a:r>
+            <a:endParaRPr lang="en-US" dirty="0" smtClean="0"/>
+          </a:p>
+          <a:p>
+            <a:pPr lvl="1"/>
             <a:r>
               <a:rPr lang="en-US" dirty="0" smtClean="0"/>
-              <a:t> or </a:t>
+              <a:t>Integration with other analysis tools such as </a:t>
             </a:r>
             <a:r>
               <a:rPr lang="en-US" dirty="0" err="1" smtClean="0"/>
-              <a:t>Six_Months_after_Treatment_Start</a:t>
-            </a:r>
+              <a:t>geWorkbench</a:t>
+            </a:r>
+            <a:endParaRPr lang="en-US" dirty="0" smtClean="0"/>
+          </a:p>
+          <a:p>
             <a:r>
               <a:rPr lang="en-US" dirty="0" smtClean="0"/>
-              <a:t>)</a:t>
-            </a:r>
-            <a:endParaRPr lang="en-US" dirty="0"/>
+              <a:t>Allow updates of study data</a:t>
+            </a:r>
+          </a:p>
+          <a:p>
+            <a:pPr lvl="1"/>
+            <a:r>
+              <a:rPr lang="en-US" dirty="0" smtClean="0"/>
+              <a:t>New study subjects</a:t>
+            </a:r>
+          </a:p>
+          <a:p>
+            <a:pPr lvl="1"/>
+            <a:r>
+              <a:rPr lang="en-US" dirty="0" smtClean="0"/>
+              <a:t>Updated clinical, imaging and array data for existing subjects</a:t>
+            </a:r>
           </a:p>
         </p:txBody>
       </p:sp>
@@ -7933,7 +8058,7 @@
           <a:p>
             <a:r>
               <a:rPr lang="en-US" sz="3600" dirty="0" smtClean="0"/>
-              <a:t>What you can do to get ready</a:t>
+              <a:t>Release Schedule</a:t>
             </a:r>
             <a:endParaRPr lang="en-US" sz="3600" dirty="0"/>
           </a:p>
@@ -7941,130 +8066,118 @@
       </p:sp>
       <p:sp>
         <p:nvSpPr>
-          <p:cNvPr id="3" name="Content Placeholder 2"/>
+          <p:cNvPr id="1026" name="AutoShape 2" descr="Image:CaI2-ReleaseSchedule.jpg"/>
           <p:cNvSpPr>
-            <a:spLocks noGrp="1"/>
+            <a:spLocks noChangeAspect="1" noChangeArrowheads="1"/>
           </p:cNvSpPr>
-          <p:nvPr>
-            <p:ph idx="1"/>
-          </p:nvPr>
+          <p:nvPr/>
         </p:nvSpPr>
-        <p:spPr/>
+        <p:spPr bwMode="auto">
+          <a:xfrm>
+            <a:off x="155575" y="-144463"/>
+            <a:ext cx="304800" cy="304801"/>
+          </a:xfrm>
+          <a:prstGeom prst="rect">
+            <a:avLst/>
+          </a:prstGeom>
+          <a:noFill/>
+        </p:spPr>
         <p:txBody>
-          <a:bodyPr/>
+          <a:bodyPr vert="horz" wrap="square" lIns="91440" tIns="45720" rIns="91440" bIns="45720" numCol="1" anchor="t" anchorCtr="0" compatLnSpc="1">
+            <a:prstTxWarp prst="textNoShape">
+              <a:avLst/>
+            </a:prstTxWarp>
+          </a:bodyPr>
           <a:lstStyle/>
           <a:p>
-            <a:r>
-              <a:rPr lang="en-US" dirty="0" smtClean="0"/>
-              <a:t>Have clinical data in CSV files</a:t>
-            </a:r>
-          </a:p>
-          <a:p>
-            <a:pPr lvl="1"/>
-            <a:r>
-              <a:rPr lang="en-US" dirty="0" smtClean="0"/>
-              <a:t>One line per patient</a:t>
-            </a:r>
-          </a:p>
-          <a:p>
-            <a:pPr lvl="1"/>
-            <a:r>
-              <a:rPr lang="en-US" dirty="0" smtClean="0"/>
-              <a:t>Your unique </a:t>
-            </a:r>
-            <a:r>
-              <a:rPr lang="en-US" dirty="0" smtClean="0"/>
-              <a:t>patient identifier in one column</a:t>
-            </a:r>
-          </a:p>
-          <a:p>
-            <a:r>
-              <a:rPr lang="en-US" dirty="0" smtClean="0"/>
-              <a:t>Array data should be deposited in </a:t>
-            </a:r>
-            <a:r>
-              <a:rPr lang="en-US" dirty="0" err="1" smtClean="0"/>
-              <a:t>caArray</a:t>
-            </a:r>
-            <a:r>
-              <a:rPr lang="en-US" dirty="0" smtClean="0"/>
-              <a:t>, either locally or the CBIIT installation</a:t>
-            </a:r>
-          </a:p>
-          <a:p>
-            <a:pPr lvl="1"/>
-            <a:r>
-              <a:rPr lang="en-US" dirty="0" smtClean="0"/>
-              <a:t>Have CSV file with two columns, one the patient id and one the </a:t>
-            </a:r>
-            <a:r>
-              <a:rPr lang="en-US" dirty="0" err="1" smtClean="0"/>
-              <a:t>caArray</a:t>
-            </a:r>
-            <a:r>
-              <a:rPr lang="en-US" dirty="0" smtClean="0"/>
-              <a:t> sample id</a:t>
-            </a:r>
-          </a:p>
-          <a:p>
-            <a:r>
-              <a:rPr lang="en-US" dirty="0" smtClean="0"/>
-              <a:t>Image </a:t>
-            </a:r>
-            <a:r>
-              <a:rPr lang="en-US" dirty="0" smtClean="0"/>
-              <a:t>data should be in NCIA as public data</a:t>
-            </a:r>
-          </a:p>
-          <a:p>
-            <a:pPr lvl="1"/>
-            <a:r>
-              <a:rPr lang="en-US" dirty="0" smtClean="0"/>
-              <a:t>Image annotation in CSV file</a:t>
-            </a:r>
-          </a:p>
-          <a:p>
-            <a:pPr lvl="2"/>
-            <a:r>
-              <a:rPr lang="en-US" dirty="0" smtClean="0"/>
-              <a:t>One line per image series</a:t>
-            </a:r>
-          </a:p>
-          <a:p>
-            <a:pPr lvl="2"/>
-            <a:r>
-              <a:rPr lang="en-US" dirty="0" smtClean="0"/>
-              <a:t>Unique image </a:t>
-            </a:r>
-            <a:r>
-              <a:rPr lang="en-US" dirty="0" smtClean="0"/>
-              <a:t>series id in one </a:t>
-            </a:r>
-            <a:r>
-              <a:rPr lang="en-US" dirty="0" smtClean="0"/>
-              <a:t>column</a:t>
-            </a:r>
-          </a:p>
-          <a:p>
-            <a:pPr lvl="1"/>
-            <a:r>
-              <a:rPr lang="en-US" dirty="0" smtClean="0"/>
-              <a:t>Have </a:t>
-            </a:r>
-            <a:r>
-              <a:rPr lang="en-US" dirty="0" smtClean="0"/>
-              <a:t>CSV file with two columns, one the image series id and one the patient </a:t>
-            </a:r>
-            <a:r>
-              <a:rPr lang="en-US" dirty="0" smtClean="0"/>
-              <a:t>id</a:t>
-            </a:r>
-          </a:p>
-          <a:p>
-            <a:endParaRPr lang="en-US" dirty="0"/>
+            <a:endParaRPr lang="en-US"/>
           </a:p>
         </p:txBody>
       </p:sp>
+      <p:sp>
+        <p:nvSpPr>
+          <p:cNvPr id="1028" name="AutoShape 4" descr="Image:CaI2-ReleaseSchedule.jpg"/>
+          <p:cNvSpPr>
+            <a:spLocks noChangeAspect="1" noChangeArrowheads="1"/>
+          </p:cNvSpPr>
+          <p:nvPr/>
+        </p:nvSpPr>
+        <p:spPr bwMode="auto">
+          <a:xfrm>
+            <a:off x="155575" y="-144463"/>
+            <a:ext cx="304800" cy="304801"/>
+          </a:xfrm>
+          <a:prstGeom prst="rect">
+            <a:avLst/>
+          </a:prstGeom>
+          <a:noFill/>
+        </p:spPr>
+        <p:txBody>
+          <a:bodyPr vert="horz" wrap="square" lIns="91440" tIns="45720" rIns="91440" bIns="45720" numCol="1" anchor="t" anchorCtr="0" compatLnSpc="1">
+            <a:prstTxWarp prst="textNoShape">
+              <a:avLst/>
+            </a:prstTxWarp>
+          </a:bodyPr>
+          <a:lstStyle/>
+          <a:p>
+            <a:endParaRPr lang="en-US"/>
+          </a:p>
+        </p:txBody>
+      </p:sp>
+      <p:sp>
+        <p:nvSpPr>
+          <p:cNvPr id="1030" name="AutoShape 6" descr="Image:CaI2-ReleaseSchedule.jpg"/>
+          <p:cNvSpPr>
+            <a:spLocks noChangeAspect="1" noChangeArrowheads="1"/>
+          </p:cNvSpPr>
+          <p:nvPr/>
+        </p:nvSpPr>
+        <p:spPr bwMode="auto">
+          <a:xfrm>
+            <a:off x="155575" y="-144463"/>
+            <a:ext cx="304800" cy="304801"/>
+          </a:xfrm>
+          <a:prstGeom prst="rect">
+            <a:avLst/>
+          </a:prstGeom>
+          <a:noFill/>
+        </p:spPr>
+        <p:txBody>
+          <a:bodyPr vert="horz" wrap="square" lIns="91440" tIns="45720" rIns="91440" bIns="45720" numCol="1" anchor="t" anchorCtr="0" compatLnSpc="1">
+            <a:prstTxWarp prst="textNoShape">
+              <a:avLst/>
+            </a:prstTxWarp>
+          </a:bodyPr>
+          <a:lstStyle/>
+          <a:p>
+            <a:endParaRPr lang="en-US"/>
+          </a:p>
+        </p:txBody>
+      </p:sp>
+      <p:pic>
+        <p:nvPicPr>
+          <p:cNvPr id="6" name="Picture 5" descr="CaI2-ReleaseSchedule.jpg"/>
+          <p:cNvPicPr>
+            <a:picLocks noChangeAspect="1"/>
+          </p:cNvPicPr>
+          <p:nvPr/>
+        </p:nvPicPr>
+        <p:blipFill>
+          <a:blip r:embed="rId2"/>
+          <a:stretch>
+            <a:fillRect/>
+          </a:stretch>
+        </p:blipFill>
+        <p:spPr>
+          <a:xfrm>
+            <a:off x="381000" y="1828800"/>
+            <a:ext cx="8420966" cy="3501000"/>
+          </a:xfrm>
+          <a:prstGeom prst="rect">
+            <a:avLst/>
+          </a:prstGeom>
+        </p:spPr>
+      </p:pic>
     </p:spTree>
   </p:cSld>
   <p:clrMapOvr>
@@ -8107,7 +8220,7 @@
           <a:p>
             <a:r>
               <a:rPr lang="en-US" sz="3600" dirty="0" smtClean="0"/>
-              <a:t>What’s next</a:t>
+              <a:t>What you can do to get ready</a:t>
             </a:r>
             <a:endParaRPr lang="en-US" sz="3600" dirty="0"/>
           </a:p>
@@ -8123,464 +8236,95 @@
             <p:ph idx="1"/>
           </p:nvPr>
         </p:nvSpPr>
-        <p:spPr>
-          <a:xfrm>
-            <a:off x="457200" y="1267326"/>
-            <a:ext cx="8229600" cy="5133474"/>
-          </a:xfrm>
-        </p:spPr>
+        <p:spPr/>
         <p:txBody>
-          <a:bodyPr>
-            <a:normAutofit/>
-          </a:bodyPr>
+          <a:bodyPr/>
           <a:lstStyle/>
           <a:p>
-            <a:pPr>
-              <a:buNone/>
-            </a:pPr>
-            <a:endParaRPr lang="en-US" dirty="0" smtClean="0"/>
-          </a:p>
-          <a:p>
             <a:r>
               <a:rPr lang="en-US" dirty="0" smtClean="0"/>
-              <a:t>Future Directions</a:t>
+              <a:t>Have clinical data in CSV files</a:t>
             </a:r>
           </a:p>
           <a:p>
             <a:pPr lvl="1"/>
             <a:r>
               <a:rPr lang="en-US" dirty="0" smtClean="0"/>
-              <a:t>Looking for interested partners running these kinds of studies</a:t>
+              <a:t>One line per patient</a:t>
             </a:r>
           </a:p>
           <a:p>
             <a:pPr lvl="1"/>
             <a:r>
               <a:rPr lang="en-US" dirty="0" smtClean="0"/>
-              <a:t>Opportunity to guide future development</a:t>
+              <a:t>Your unique patient identifier in one column</a:t>
+            </a:r>
+          </a:p>
+          <a:p>
+            <a:r>
+              <a:rPr lang="en-US" dirty="0" smtClean="0"/>
+              <a:t>Array data should be deposited in </a:t>
+            </a:r>
+            <a:r>
+              <a:rPr lang="en-US" dirty="0" err="1" smtClean="0"/>
+              <a:t>caArray</a:t>
+            </a:r>
+            <a:r>
+              <a:rPr lang="en-US" dirty="0" smtClean="0"/>
+              <a:t>, either locally or the CBIIT installation</a:t>
             </a:r>
           </a:p>
           <a:p>
             <a:pPr lvl="1"/>
-            <a:endParaRPr lang="en-US" dirty="0" smtClean="0"/>
+            <a:r>
+              <a:rPr lang="en-US" dirty="0" smtClean="0"/>
+              <a:t>Have CSV file with two columns, one the patient id and one the </a:t>
+            </a:r>
+            <a:r>
+              <a:rPr lang="en-US" dirty="0" err="1" smtClean="0"/>
+              <a:t>caArray</a:t>
+            </a:r>
+            <a:r>
+              <a:rPr lang="en-US" dirty="0" smtClean="0"/>
+              <a:t> sample id</a:t>
+            </a:r>
+          </a:p>
+          <a:p>
+            <a:r>
+              <a:rPr lang="en-US" dirty="0" smtClean="0"/>
+              <a:t>Image data should be in NCIA as public data</a:t>
+            </a:r>
           </a:p>
           <a:p>
             <a:pPr lvl="1"/>
             <a:r>
               <a:rPr lang="en-US" dirty="0" smtClean="0"/>
-              <a:t>Incorporate other types of genomic data such as copy number, </a:t>
-            </a:r>
-            <a:r>
-              <a:rPr lang="en-US" dirty="0" err="1" smtClean="0"/>
-              <a:t>methylation</a:t>
-            </a:r>
+              <a:t>Image annotation in CSV file</a:t>
+            </a:r>
+          </a:p>
+          <a:p>
+            <a:pPr lvl="2"/>
             <a:r>
               <a:rPr lang="en-US" dirty="0" smtClean="0"/>
-              <a:t>, tissue microarray, and genotypes</a:t>
+              <a:t>One line per image series</a:t>
+            </a:r>
+          </a:p>
+          <a:p>
+            <a:pPr lvl="2"/>
+            <a:r>
+              <a:rPr lang="en-US" dirty="0" smtClean="0"/>
+              <a:t>Unique image series id in one column</a:t>
             </a:r>
           </a:p>
           <a:p>
             <a:pPr lvl="1"/>
-            <a:endParaRPr lang="en-US" dirty="0" smtClean="0"/>
-          </a:p>
-          <a:p>
-            <a:pPr lvl="1"/>
             <a:r>
               <a:rPr lang="en-US" dirty="0" smtClean="0"/>
-              <a:t>Tighter integration with </a:t>
-            </a:r>
-            <a:r>
-              <a:rPr lang="en-US" dirty="0" err="1" smtClean="0"/>
-              <a:t>GenePattern</a:t>
-            </a:r>
-            <a:r>
-              <a:rPr lang="en-US" dirty="0" smtClean="0"/>
-              <a:t> and other analysis tools</a:t>
-            </a:r>
-          </a:p>
-          <a:p>
-            <a:pPr lvl="1"/>
-            <a:endParaRPr lang="en-US" dirty="0" smtClean="0"/>
-          </a:p>
-          <a:p>
-            <a:pPr lvl="1"/>
-            <a:endParaRPr lang="en-US" dirty="0" smtClean="0"/>
-          </a:p>
-          <a:p>
-            <a:pPr lvl="1"/>
-            <a:r>
-              <a:rPr lang="en-US" dirty="0" smtClean="0"/>
-              <a:t>Handle studies with multiple </a:t>
-            </a:r>
-            <a:r>
-              <a:rPr lang="en-US" dirty="0" err="1" smtClean="0"/>
-              <a:t>timepoints</a:t>
-            </a:r>
-            <a:endParaRPr lang="en-US" dirty="0" smtClean="0"/>
-          </a:p>
-          <a:p>
-            <a:pPr lvl="1"/>
+              <a:t>Have CSV file with two columns, one the image series id and one the patient id</a:t>
+            </a:r>
+          </a:p>
+          <a:p>
             <a:endParaRPr lang="en-US" dirty="0"/>
-          </a:p>
-          <a:p>
-            <a:pPr lvl="1"/>
-            <a:endParaRPr lang="en-US" dirty="0" smtClean="0"/>
-          </a:p>
-          <a:p>
-            <a:pPr lvl="1"/>
-            <a:r>
-              <a:rPr lang="en-US" dirty="0" smtClean="0"/>
-              <a:t>Allow regular updates of data</a:t>
-            </a:r>
-          </a:p>
-        </p:txBody>
-      </p:sp>
-      <p:pic>
-        <p:nvPicPr>
-          <p:cNvPr id="1029" name="Picture 5"/>
-          <p:cNvPicPr>
-            <a:picLocks noChangeAspect="1" noChangeArrowheads="1"/>
-          </p:cNvPicPr>
-          <p:nvPr/>
-        </p:nvPicPr>
-        <p:blipFill>
-          <a:blip r:embed="rId2"/>
-          <a:srcRect/>
-          <a:stretch>
-            <a:fillRect/>
-          </a:stretch>
-        </p:blipFill>
-        <p:spPr bwMode="auto">
-          <a:xfrm>
-            <a:off x="4503085" y="4239082"/>
-            <a:ext cx="542925" cy="561518"/>
-          </a:xfrm>
-          <a:prstGeom prst="rect">
-            <a:avLst/>
-          </a:prstGeom>
-          <a:noFill/>
-          <a:ln w="9525">
-            <a:noFill/>
-            <a:miter lim="800000"/>
-            <a:headEnd/>
-            <a:tailEnd/>
-          </a:ln>
-          <a:effectLst/>
-        </p:spPr>
-      </p:pic>
-      <p:pic>
-        <p:nvPicPr>
-          <p:cNvPr id="1028" name="Picture 4"/>
-          <p:cNvPicPr>
-            <a:picLocks noChangeAspect="1" noChangeArrowheads="1"/>
-          </p:cNvPicPr>
-          <p:nvPr/>
-        </p:nvPicPr>
-        <p:blipFill>
-          <a:blip r:embed="rId3"/>
-          <a:srcRect/>
-          <a:stretch>
-            <a:fillRect/>
-          </a:stretch>
-        </p:blipFill>
-        <p:spPr bwMode="auto">
-          <a:xfrm>
-            <a:off x="1828800" y="4238625"/>
-            <a:ext cx="2105025" cy="485775"/>
-          </a:xfrm>
-          <a:prstGeom prst="rect">
-            <a:avLst/>
-          </a:prstGeom>
-          <a:noFill/>
-          <a:ln w="9525">
-            <a:noFill/>
-            <a:miter lim="800000"/>
-            <a:headEnd/>
-            <a:tailEnd/>
-          </a:ln>
-          <a:effectLst/>
-        </p:spPr>
-      </p:pic>
-      <p:grpSp>
-        <p:nvGrpSpPr>
-          <p:cNvPr id="16" name="Group 15"/>
-          <p:cNvGrpSpPr/>
-          <p:nvPr/>
-        </p:nvGrpSpPr>
-        <p:grpSpPr>
-          <a:xfrm>
-            <a:off x="2133600" y="5300990"/>
-            <a:ext cx="2895600" cy="490210"/>
-            <a:chOff x="5181600" y="5072390"/>
-            <a:chExt cx="2895600" cy="490210"/>
-          </a:xfrm>
-        </p:grpSpPr>
-        <p:cxnSp>
-          <p:nvCxnSpPr>
-            <p:cNvPr id="10" name="Straight Connector 9"/>
-            <p:cNvCxnSpPr/>
-            <p:nvPr/>
-          </p:nvCxnSpPr>
-          <p:spPr>
-            <a:xfrm>
-              <a:off x="5638800" y="5148590"/>
-              <a:ext cx="1600200" cy="1588"/>
-            </a:xfrm>
-            <a:prstGeom prst="line">
-              <a:avLst/>
-            </a:prstGeom>
-            <a:ln>
-              <a:solidFill>
-                <a:schemeClr val="accent2"/>
-              </a:solidFill>
-            </a:ln>
-          </p:spPr>
-          <p:style>
-            <a:lnRef idx="1">
-              <a:schemeClr val="accent1"/>
-            </a:lnRef>
-            <a:fillRef idx="0">
-              <a:schemeClr val="accent1"/>
-            </a:fillRef>
-            <a:effectRef idx="0">
-              <a:schemeClr val="accent1"/>
-            </a:effectRef>
-            <a:fontRef idx="minor">
-              <a:schemeClr val="tx1"/>
-            </a:fontRef>
-          </p:style>
-        </p:cxnSp>
-        <p:sp>
-          <p:nvSpPr>
-            <p:cNvPr id="11" name="Oval 10"/>
-            <p:cNvSpPr/>
-            <p:nvPr/>
-          </p:nvSpPr>
-          <p:spPr>
-            <a:xfrm>
-              <a:off x="7162800" y="5072390"/>
-              <a:ext cx="152400" cy="152400"/>
-            </a:xfrm>
-            <a:prstGeom prst="ellipse">
-              <a:avLst/>
-            </a:prstGeom>
-            <a:solidFill>
-              <a:schemeClr val="accent2"/>
-            </a:solidFill>
-            <a:ln>
-              <a:solidFill>
-                <a:schemeClr val="accent2"/>
-              </a:solidFill>
-            </a:ln>
-            <a:scene3d>
-              <a:camera prst="orthographicFront"/>
-              <a:lightRig rig="threePt" dir="t"/>
-            </a:scene3d>
-            <a:sp3d>
-              <a:bevelT/>
-            </a:sp3d>
-          </p:spPr>
-          <p:style>
-            <a:lnRef idx="2">
-              <a:schemeClr val="accent1">
-                <a:shade val="50000"/>
-              </a:schemeClr>
-            </a:lnRef>
-            <a:fillRef idx="1">
-              <a:schemeClr val="accent1"/>
-            </a:fillRef>
-            <a:effectRef idx="0">
-              <a:schemeClr val="accent1"/>
-            </a:effectRef>
-            <a:fontRef idx="minor">
-              <a:schemeClr val="lt1"/>
-            </a:fontRef>
-          </p:style>
-          <p:txBody>
-            <a:bodyPr rtlCol="0" anchor="ctr"/>
-            <a:lstStyle/>
-            <a:p>
-              <a:pPr algn="ctr"/>
-              <a:endParaRPr lang="en-US"/>
-            </a:p>
-          </p:txBody>
-        </p:sp>
-        <p:sp>
-          <p:nvSpPr>
-            <p:cNvPr id="12" name="Oval 11"/>
-            <p:cNvSpPr/>
-            <p:nvPr/>
-          </p:nvSpPr>
-          <p:spPr>
-            <a:xfrm>
-              <a:off x="6172200" y="5072390"/>
-              <a:ext cx="152400" cy="152400"/>
-            </a:xfrm>
-            <a:prstGeom prst="ellipse">
-              <a:avLst/>
-            </a:prstGeom>
-            <a:solidFill>
-              <a:schemeClr val="accent2"/>
-            </a:solidFill>
-            <a:ln>
-              <a:solidFill>
-                <a:schemeClr val="accent2"/>
-              </a:solidFill>
-            </a:ln>
-            <a:scene3d>
-              <a:camera prst="orthographicFront"/>
-              <a:lightRig rig="threePt" dir="t"/>
-            </a:scene3d>
-            <a:sp3d>
-              <a:bevelT/>
-            </a:sp3d>
-          </p:spPr>
-          <p:style>
-            <a:lnRef idx="2">
-              <a:schemeClr val="accent1">
-                <a:shade val="50000"/>
-              </a:schemeClr>
-            </a:lnRef>
-            <a:fillRef idx="1">
-              <a:schemeClr val="accent1"/>
-            </a:fillRef>
-            <a:effectRef idx="0">
-              <a:schemeClr val="accent1"/>
-            </a:effectRef>
-            <a:fontRef idx="minor">
-              <a:schemeClr val="lt1"/>
-            </a:fontRef>
-          </p:style>
-          <p:txBody>
-            <a:bodyPr rtlCol="0" anchor="ctr"/>
-            <a:lstStyle/>
-            <a:p>
-              <a:pPr algn="ctr"/>
-              <a:endParaRPr lang="en-US"/>
-            </a:p>
-          </p:txBody>
-        </p:sp>
-        <p:sp>
-          <p:nvSpPr>
-            <p:cNvPr id="13" name="Oval 12"/>
-            <p:cNvSpPr/>
-            <p:nvPr/>
-          </p:nvSpPr>
-          <p:spPr>
-            <a:xfrm>
-              <a:off x="5562600" y="5088432"/>
-              <a:ext cx="152400" cy="152400"/>
-            </a:xfrm>
-            <a:prstGeom prst="ellipse">
-              <a:avLst/>
-            </a:prstGeom>
-            <a:solidFill>
-              <a:schemeClr val="accent2"/>
-            </a:solidFill>
-            <a:ln>
-              <a:solidFill>
-                <a:schemeClr val="accent2"/>
-              </a:solidFill>
-            </a:ln>
-            <a:scene3d>
-              <a:camera prst="orthographicFront"/>
-              <a:lightRig rig="threePt" dir="t"/>
-            </a:scene3d>
-            <a:sp3d>
-              <a:bevelT/>
-            </a:sp3d>
-          </p:spPr>
-          <p:style>
-            <a:lnRef idx="2">
-              <a:schemeClr val="accent1">
-                <a:shade val="50000"/>
-              </a:schemeClr>
-            </a:lnRef>
-            <a:fillRef idx="1">
-              <a:schemeClr val="accent1"/>
-            </a:fillRef>
-            <a:effectRef idx="0">
-              <a:schemeClr val="accent1"/>
-            </a:effectRef>
-            <a:fontRef idx="minor">
-              <a:schemeClr val="lt1"/>
-            </a:fontRef>
-          </p:style>
-          <p:txBody>
-            <a:bodyPr rtlCol="0" anchor="ctr"/>
-            <a:lstStyle/>
-            <a:p>
-              <a:pPr algn="ctr"/>
-              <a:endParaRPr lang="en-US"/>
-            </a:p>
-          </p:txBody>
-        </p:sp>
-        <p:sp>
-          <p:nvSpPr>
-            <p:cNvPr id="14" name="TextBox 13"/>
-            <p:cNvSpPr txBox="1"/>
-            <p:nvPr/>
-          </p:nvSpPr>
-          <p:spPr>
-            <a:xfrm>
-              <a:off x="5181600" y="5300990"/>
-              <a:ext cx="2895600" cy="261610"/>
-            </a:xfrm>
-            <a:prstGeom prst="rect">
-              <a:avLst/>
-            </a:prstGeom>
-            <a:noFill/>
-          </p:spPr>
-          <p:txBody>
-            <a:bodyPr wrap="square" rtlCol="0">
-              <a:spAutoFit/>
-            </a:bodyPr>
-            <a:lstStyle/>
-            <a:p>
-              <a:r>
-                <a:rPr lang="en-US" sz="1100" dirty="0" smtClean="0"/>
-                <a:t>Diagnosis   Treatment        </a:t>
-              </a:r>
-              <a:r>
-                <a:rPr lang="en-US" sz="1100" dirty="0" err="1" smtClean="0"/>
-                <a:t>Followup</a:t>
-              </a:r>
-              <a:r>
-                <a:rPr lang="en-US" sz="1100" dirty="0" smtClean="0"/>
-                <a:t> </a:t>
-              </a:r>
-              <a:endParaRPr lang="en-US" sz="1100" dirty="0"/>
-            </a:p>
-          </p:txBody>
-        </p:sp>
-      </p:grpSp>
-      <p:sp>
-        <p:nvSpPr>
-          <p:cNvPr id="15" name="TextBox 14"/>
-          <p:cNvSpPr txBox="1"/>
-          <p:nvPr/>
-        </p:nvSpPr>
-        <p:spPr>
-          <a:xfrm>
-            <a:off x="4655720" y="4407568"/>
-            <a:ext cx="1821280" cy="369332"/>
-          </a:xfrm>
-          <a:prstGeom prst="rect">
-            <a:avLst/>
-          </a:prstGeom>
-          <a:noFill/>
-        </p:spPr>
-        <p:txBody>
-          <a:bodyPr wrap="square" rtlCol="0">
-            <a:spAutoFit/>
-          </a:bodyPr>
-          <a:lstStyle/>
-          <a:p>
-            <a:r>
-              <a:rPr lang="en-US" b="1" dirty="0" err="1" smtClean="0"/>
-              <a:t>geWorkbench</a:t>
-            </a:r>
-            <a:endParaRPr lang="en-US" b="1" dirty="0"/>
           </a:p>
         </p:txBody>
       </p:sp>
@@ -8589,13 +8333,6 @@
   <p:clrMapOvr>
     <a:masterClrMapping/>
   </p:clrMapOvr>
-  <p:timing>
-    <p:tnLst>
-      <p:par>
-        <p:cTn id="1" dur="indefinite" restart="never" nodeType="tmRoot"/>
-      </p:par>
-    </p:tnLst>
-  </p:timing>
 </p:sld>
 </file>
 

</xml_diff>

<commit_message>
updates to demo/video materials for meeting review
</commit_message>
<xml_diff>
--- a/docs/project_management/external_meetings/Pre Alpha Release Intro Slides.pptx
+++ b/docs/project_management/external_meetings/Pre Alpha Release Intro Slides.pptx
@@ -2887,15 +2887,7 @@
             <a:pPr lvl="1"/>
             <a:r>
               <a:rPr lang="en-US" dirty="0" smtClean="0"/>
-              <a:t>For </a:t>
-            </a:r>
-            <a:r>
-              <a:rPr lang="en-US" dirty="0" smtClean="0"/>
-              <a:t>this pre-alpha </a:t>
-            </a:r>
-            <a:r>
-              <a:rPr lang="en-US" dirty="0" smtClean="0"/>
-              <a:t>release</a:t>
+              <a:t>For this pre-alpha release</a:t>
             </a:r>
           </a:p>
           <a:p>
@@ -3613,19 +3605,7 @@
           <a:p>
             <a:r>
               <a:rPr lang="en-US" sz="3600" dirty="0" smtClean="0"/>
-              <a:t>How </a:t>
-            </a:r>
-            <a:r>
-              <a:rPr lang="en-US" sz="3600" dirty="0" smtClean="0"/>
-              <a:t>caIntegrator2</a:t>
-            </a:r>
-            <a:r>
-              <a:rPr lang="en-US" sz="3600" dirty="0" smtClean="0"/>
-              <a:t> </a:t>
-            </a:r>
-            <a:r>
-              <a:rPr lang="en-US" sz="3600" dirty="0" smtClean="0"/>
-              <a:t>works</a:t>
+              <a:t>How caIntegrator2 works</a:t>
             </a:r>
             <a:endParaRPr lang="en-US" sz="3600" dirty="0"/>
           </a:p>
@@ -7734,11 +7714,7 @@
           <a:p>
             <a:r>
               <a:rPr lang="en-US" sz="2000" dirty="0" smtClean="0"/>
-              <a:t>Write </a:t>
-            </a:r>
-            <a:r>
-              <a:rPr lang="en-US" sz="2000" dirty="0" smtClean="0"/>
-              <a:t>complex queries</a:t>
+              <a:t>Write complex queries</a:t>
             </a:r>
           </a:p>
           <a:p>
@@ -7857,18 +7833,19 @@
           <a:p>
             <a:r>
               <a:rPr lang="en-US" dirty="0" smtClean="0"/>
-              <a:t>More data types</a:t>
-            </a:r>
+              <a:t>More </a:t>
+            </a:r>
+            <a:r>
+              <a:rPr lang="en-US" dirty="0" smtClean="0"/>
+              <a:t>types of data</a:t>
+            </a:r>
+            <a:endParaRPr lang="en-US" dirty="0" smtClean="0"/>
           </a:p>
           <a:p>
             <a:pPr lvl="1"/>
             <a:r>
               <a:rPr lang="en-US" dirty="0" smtClean="0"/>
-              <a:t>C</a:t>
-            </a:r>
-            <a:r>
-              <a:rPr lang="en-US" dirty="0" smtClean="0"/>
-              <a:t>opy number</a:t>
+              <a:t>Copy number</a:t>
             </a:r>
           </a:p>
           <a:p>
@@ -7882,11 +7859,19 @@
             <a:pPr lvl="1"/>
             <a:r>
               <a:rPr lang="en-US" dirty="0" err="1" smtClean="0"/>
-              <a:t>Methy</a:t>
+              <a:t>Methylation</a:t>
+            </a:r>
+            <a:endParaRPr lang="en-US" dirty="0" smtClean="0"/>
+          </a:p>
+          <a:p>
+            <a:pPr lvl="1"/>
+            <a:r>
+              <a:rPr lang="en-US" dirty="0" smtClean="0"/>
+              <a:t>Tissue data from </a:t>
             </a:r>
             <a:r>
               <a:rPr lang="en-US" dirty="0" err="1" smtClean="0"/>
-              <a:t>lation</a:t>
+              <a:t>caTissue</a:t>
             </a:r>
             <a:endParaRPr lang="en-US" dirty="0" smtClean="0"/>
           </a:p>
@@ -7901,31 +7886,7 @@
             <a:pPr lvl="1"/>
             <a:r>
               <a:rPr lang="en-US" dirty="0" smtClean="0"/>
-              <a:t>Cl</a:t>
-            </a:r>
-            <a:r>
-              <a:rPr lang="en-US" dirty="0" smtClean="0"/>
-              <a:t>inical</a:t>
-            </a:r>
-            <a:r>
-              <a:rPr lang="en-US" dirty="0" smtClean="0"/>
-              <a:t>, array and imaging data </a:t>
-            </a:r>
-            <a:r>
-              <a:rPr lang="en-US" dirty="0" smtClean="0"/>
-              <a:t>can be associated with</a:t>
-            </a:r>
-            <a:r>
-              <a:rPr lang="en-US" dirty="0" smtClean="0"/>
-              <a:t> </a:t>
-            </a:r>
-            <a:r>
-              <a:rPr lang="en-US" dirty="0" smtClean="0"/>
-              <a:t>specific </a:t>
-            </a:r>
-            <a:r>
-              <a:rPr lang="en-US" dirty="0" smtClean="0"/>
-              <a:t>study </a:t>
+              <a:t>Clinical, array and imaging data can be associated with specific study </a:t>
             </a:r>
             <a:r>
               <a:rPr lang="en-US" dirty="0" err="1" smtClean="0"/>
@@ -7933,23 +7894,7 @@
             </a:r>
             <a:r>
               <a:rPr lang="en-US" dirty="0" smtClean="0"/>
-              <a:t> </a:t>
-            </a:r>
-            <a:r>
-              <a:rPr lang="en-US" dirty="0" smtClean="0"/>
-              <a:t>(for instance, </a:t>
-            </a:r>
-            <a:r>
-              <a:rPr lang="en-US" dirty="0" smtClean="0"/>
-              <a:t>‘Time of Diagnosis’ </a:t>
-            </a:r>
-            <a:r>
-              <a:rPr lang="en-US" dirty="0" smtClean="0"/>
-              <a:t>or </a:t>
-            </a:r>
-            <a:r>
-              <a:rPr lang="en-US" dirty="0" smtClean="0"/>
-              <a:t>‘Six Months after Treatment Start’)</a:t>
+              <a:t> (for instance, ‘Time of Diagnosis’ or ‘Six Months after Treatment Start’)</a:t>
             </a:r>
           </a:p>
           <a:p>

</xml_diff>

<commit_message>
fixed caGRID icons in diagram
</commit_message>
<xml_diff>
--- a/docs/project_management/external_meetings/Pre Alpha Release Intro Slides.pptx
+++ b/docs/project_management/external_meetings/Pre Alpha Release Intro Slides.pptx
@@ -2791,6 +2791,76 @@
       </p:grpSpPr>
       <p:pic>
         <p:nvPicPr>
+          <p:cNvPr id="62" name="Picture 4"/>
+          <p:cNvPicPr>
+            <a:picLocks noChangeAspect="1" noChangeArrowheads="1"/>
+          </p:cNvPicPr>
+          <p:nvPr/>
+        </p:nvPicPr>
+        <p:blipFill>
+          <a:blip r:embed="rId2" cstate="print">
+            <a:lum/>
+          </a:blip>
+          <a:srcRect/>
+          <a:stretch>
+            <a:fillRect/>
+          </a:stretch>
+        </p:blipFill>
+        <p:spPr bwMode="auto">
+          <a:xfrm>
+            <a:off x="5570062" y="4844240"/>
+            <a:ext cx="382283" cy="413560"/>
+          </a:xfrm>
+          <a:prstGeom prst="rect">
+            <a:avLst/>
+          </a:prstGeom>
+          <a:noFill/>
+          <a:ln w="9525">
+            <a:noFill/>
+            <a:miter lim="800000"/>
+            <a:headEnd/>
+            <a:tailEnd/>
+          </a:ln>
+          <a:effectLst/>
+        </p:spPr>
+      </p:pic>
+      <p:pic>
+        <p:nvPicPr>
+          <p:cNvPr id="61" name="Picture 4"/>
+          <p:cNvPicPr>
+            <a:picLocks noChangeAspect="1" noChangeArrowheads="1"/>
+          </p:cNvPicPr>
+          <p:nvPr/>
+        </p:nvPicPr>
+        <p:blipFill>
+          <a:blip r:embed="rId2" cstate="print">
+            <a:lum/>
+          </a:blip>
+          <a:srcRect/>
+          <a:stretch>
+            <a:fillRect/>
+          </a:stretch>
+        </p:blipFill>
+        <p:spPr bwMode="auto">
+          <a:xfrm>
+            <a:off x="5417662" y="4419600"/>
+            <a:ext cx="382283" cy="413560"/>
+          </a:xfrm>
+          <a:prstGeom prst="rect">
+            <a:avLst/>
+          </a:prstGeom>
+          <a:noFill/>
+          <a:ln w="9525">
+            <a:noFill/>
+            <a:miter lim="800000"/>
+            <a:headEnd/>
+            <a:tailEnd/>
+          </a:ln>
+          <a:effectLst/>
+        </p:spPr>
+      </p:pic>
+      <p:pic>
+        <p:nvPicPr>
           <p:cNvPr id="127" name="Picture 4"/>
           <p:cNvPicPr>
             <a:picLocks noChangeAspect="1" noChangeArrowheads="1"/>
@@ -3081,15 +3151,7 @@
           <a:p>
             <a:r>
               <a:rPr lang="en-US" sz="1600" dirty="0" smtClean="0"/>
-              <a:t>Study</a:t>
-            </a:r>
-            <a:r>
-              <a:rPr lang="en-US" sz="1600" dirty="0" smtClean="0"/>
-              <a:t> </a:t>
-            </a:r>
-            <a:r>
-              <a:rPr lang="en-US" sz="1600" dirty="0" smtClean="0"/>
-              <a:t>Team</a:t>
+              <a:t>Study Team</a:t>
             </a:r>
             <a:endParaRPr lang="en-US" sz="1600" dirty="0"/>
           </a:p>
@@ -3576,15 +3638,7 @@
           <a:p>
             <a:r>
               <a:rPr lang="en-US" sz="1600" dirty="0" smtClean="0"/>
-              <a:t>Study</a:t>
-            </a:r>
-            <a:r>
-              <a:rPr lang="en-US" sz="1600" dirty="0" smtClean="0"/>
-              <a:t> </a:t>
-            </a:r>
-            <a:r>
-              <a:rPr lang="en-US" sz="1600" dirty="0" smtClean="0"/>
-              <a:t>Team</a:t>
+              <a:t>Study Team</a:t>
             </a:r>
           </a:p>
           <a:p>
@@ -6396,6 +6450,60 @@
                                   </p:childTnLst>
                                 </p:cTn>
                               </p:par>
+                              <p:par>
+                                <p:cTn id="127" presetID="1" presetClass="entr" presetSubtype="0" fill="hold" nodeType="withEffect">
+                                  <p:stCondLst>
+                                    <p:cond delay="0"/>
+                                  </p:stCondLst>
+                                  <p:childTnLst>
+                                    <p:set>
+                                      <p:cBhvr>
+                                        <p:cTn id="128" dur="1" fill="hold">
+                                          <p:stCondLst>
+                                            <p:cond delay="0"/>
+                                          </p:stCondLst>
+                                        </p:cTn>
+                                        <p:tgtEl>
+                                          <p:spTgt spid="61"/>
+                                        </p:tgtEl>
+                                        <p:attrNameLst>
+                                          <p:attrName>style.visibility</p:attrName>
+                                        </p:attrNameLst>
+                                      </p:cBhvr>
+                                      <p:to>
+                                        <p:strVal val="visible"/>
+                                      </p:to>
+                                    </p:set>
+                                  </p:childTnLst>
+                                </p:cTn>
+                              </p:par>
+                              <p:par>
+                                <p:cTn id="129" presetID="1" presetClass="entr" presetSubtype="0" fill="hold" nodeType="withEffect">
+                                  <p:stCondLst>
+                                    <p:cond delay="0"/>
+                                  </p:stCondLst>
+                                  <p:childTnLst>
+                                    <p:set>
+                                      <p:cBhvr>
+                                        <p:cTn id="130" dur="1" fill="hold">
+                                          <p:stCondLst>
+                                            <p:cond delay="0"/>
+                                          </p:stCondLst>
+                                        </p:cTn>
+                                        <p:tgtEl>
+                                          <p:spTgt spid="62"/>
+                                        </p:tgtEl>
+                                        <p:attrNameLst>
+                                          <p:attrName>style.visibility</p:attrName>
+                                        </p:attrNameLst>
+                                      </p:cBhvr>
+                                      <p:to>
+                                        <p:strVal val="visible"/>
+                                      </p:to>
+                                    </p:set>
+                                  </p:childTnLst>
+                                </p:cTn>
+                              </p:par>
                             </p:childTnLst>
                           </p:cTn>
                         </p:par>
@@ -6556,11 +6664,7 @@
             <a:pPr lvl="1"/>
             <a:r>
               <a:rPr lang="en-US" sz="2000" dirty="0" smtClean="0"/>
-              <a:t>Define multiple measure of patient </a:t>
-            </a:r>
-            <a:r>
-              <a:rPr lang="en-US" sz="2000" dirty="0" smtClean="0"/>
-              <a:t>survival</a:t>
+              <a:t>Define multiple measure of patient survival</a:t>
             </a:r>
           </a:p>
           <a:p>
@@ -6569,7 +6673,6 @@
               <a:rPr lang="en-US" sz="2000" dirty="0" smtClean="0"/>
               <a:t>Define a set of control samples for fold change calculations</a:t>
             </a:r>
-            <a:endParaRPr lang="en-US" sz="2000" dirty="0" smtClean="0"/>
           </a:p>
           <a:p>
             <a:r>
@@ -6922,30 +7025,13 @@
           <a:p>
             <a:r>
               <a:rPr lang="en-US" sz="2000" dirty="0" smtClean="0"/>
-              <a:t>Beta </a:t>
-            </a:r>
+              <a:t>Beta release in Q2/Q3 2009</a:t>
+            </a:r>
+          </a:p>
+          <a:p>
             <a:r>
               <a:rPr lang="en-US" sz="2000" dirty="0" smtClean="0"/>
-              <a:t>release </a:t>
-            </a:r>
-            <a:r>
-              <a:rPr lang="en-US" sz="2000" dirty="0" smtClean="0"/>
-              <a:t>in Q2/Q3 2009</a:t>
-            </a:r>
-            <a:endParaRPr lang="en-US" sz="2000" dirty="0" smtClean="0"/>
-          </a:p>
-          <a:p>
-            <a:r>
-              <a:rPr lang="en-US" sz="2000" dirty="0" smtClean="0"/>
-              <a:t>1.0 Release in </a:t>
-            </a:r>
-            <a:r>
-              <a:rPr lang="en-US" sz="2000" dirty="0" smtClean="0"/>
-              <a:t>September, </a:t>
-            </a:r>
-            <a:r>
-              <a:rPr lang="en-US" sz="2000" dirty="0" smtClean="0"/>
-              <a:t>2009</a:t>
+              <a:t>1.0 Release in September, 2009</a:t>
             </a:r>
           </a:p>
         </p:txBody>
@@ -7126,11 +7212,7 @@
             <a:pPr lvl="1"/>
             <a:r>
               <a:rPr lang="en-US" dirty="0" smtClean="0"/>
-              <a:t>Your unique patient identifier in one </a:t>
-            </a:r>
-            <a:r>
-              <a:rPr lang="en-US" dirty="0" smtClean="0"/>
-              <a:t>column</a:t>
+              <a:t>Your unique patient identifier in one column</a:t>
             </a:r>
           </a:p>
           <a:p>
@@ -7143,7 +7225,6 @@
               <a:rPr lang="en-US" dirty="0" smtClean="0"/>
               <a:t> identifier, if applicable, in one column</a:t>
             </a:r>
-            <a:endParaRPr lang="en-US" dirty="0" smtClean="0"/>
           </a:p>
           <a:p>
             <a:r>

</xml_diff>

<commit_message>
updated with genepattern graphic
</commit_message>
<xml_diff>
--- a/docs/project_management/external_meetings/Pre Alpha Release Intro Slides.pptx
+++ b/docs/project_management/external_meetings/Pre Alpha Release Intro Slides.pptx
@@ -2791,25 +2791,23 @@
       </p:grpSpPr>
       <p:pic>
         <p:nvPicPr>
-          <p:cNvPr id="62" name="Picture 4"/>
+          <p:cNvPr id="1027" name="Picture 3"/>
           <p:cNvPicPr>
             <a:picLocks noChangeAspect="1" noChangeArrowheads="1"/>
           </p:cNvPicPr>
           <p:nvPr/>
         </p:nvPicPr>
         <p:blipFill>
-          <a:blip r:embed="rId2" cstate="print">
-            <a:lum/>
-          </a:blip>
+          <a:blip r:embed="rId2"/>
           <a:srcRect/>
           <a:stretch>
             <a:fillRect/>
           </a:stretch>
         </p:blipFill>
         <p:spPr bwMode="auto">
-          <a:xfrm>
-            <a:off x="5570062" y="4844240"/>
-            <a:ext cx="382283" cy="413560"/>
+          <a:xfrm rot="16200000">
+            <a:off x="7248525" y="971550"/>
+            <a:ext cx="619125" cy="1704975"/>
           </a:xfrm>
           <a:prstGeom prst="rect">
             <a:avLst/>
@@ -2826,14 +2824,14 @@
       </p:pic>
       <p:pic>
         <p:nvPicPr>
-          <p:cNvPr id="61" name="Picture 4"/>
+          <p:cNvPr id="62" name="Picture 4"/>
           <p:cNvPicPr>
             <a:picLocks noChangeAspect="1" noChangeArrowheads="1"/>
           </p:cNvPicPr>
           <p:nvPr/>
         </p:nvPicPr>
         <p:blipFill>
-          <a:blip r:embed="rId2" cstate="print">
+          <a:blip r:embed="rId3" cstate="print">
             <a:lum/>
           </a:blip>
           <a:srcRect/>
@@ -2843,7 +2841,7 @@
         </p:blipFill>
         <p:spPr bwMode="auto">
           <a:xfrm>
-            <a:off x="5417662" y="4419600"/>
+            <a:off x="5570062" y="4965862"/>
             <a:ext cx="382283" cy="413560"/>
           </a:xfrm>
           <a:prstGeom prst="rect">
@@ -2861,14 +2859,14 @@
       </p:pic>
       <p:pic>
         <p:nvPicPr>
-          <p:cNvPr id="127" name="Picture 4"/>
+          <p:cNvPr id="61" name="Picture 4"/>
           <p:cNvPicPr>
             <a:picLocks noChangeAspect="1" noChangeArrowheads="1"/>
           </p:cNvPicPr>
           <p:nvPr/>
         </p:nvPicPr>
         <p:blipFill>
-          <a:blip r:embed="rId2" cstate="print">
+          <a:blip r:embed="rId3" cstate="print">
             <a:lum/>
           </a:blip>
           <a:srcRect/>
@@ -2878,7 +2876,7 @@
         </p:blipFill>
         <p:spPr bwMode="auto">
           <a:xfrm>
-            <a:off x="5032402" y="3822848"/>
+            <a:off x="5417662" y="4541222"/>
             <a:ext cx="382283" cy="413560"/>
           </a:xfrm>
           <a:prstGeom prst="rect">
@@ -2896,14 +2894,14 @@
       </p:pic>
       <p:pic>
         <p:nvPicPr>
-          <p:cNvPr id="126" name="Picture 4"/>
+          <p:cNvPr id="127" name="Picture 4"/>
           <p:cNvPicPr>
             <a:picLocks noChangeAspect="1" noChangeArrowheads="1"/>
           </p:cNvPicPr>
           <p:nvPr/>
         </p:nvPicPr>
         <p:blipFill>
-          <a:blip r:embed="rId2" cstate="print">
+          <a:blip r:embed="rId3" cstate="print">
             <a:lum/>
           </a:blip>
           <a:srcRect/>
@@ -2913,7 +2911,7 @@
         </p:blipFill>
         <p:spPr bwMode="auto">
           <a:xfrm>
-            <a:off x="4673812" y="3159464"/>
+            <a:off x="5032402" y="3944470"/>
             <a:ext cx="382283" cy="413560"/>
           </a:xfrm>
           <a:prstGeom prst="rect">
@@ -2931,14 +2929,16 @@
       </p:pic>
       <p:pic>
         <p:nvPicPr>
-          <p:cNvPr id="1028" name="Picture 4"/>
+          <p:cNvPr id="126" name="Picture 4"/>
           <p:cNvPicPr>
             <a:picLocks noChangeAspect="1" noChangeArrowheads="1"/>
           </p:cNvPicPr>
           <p:nvPr/>
         </p:nvPicPr>
         <p:blipFill>
-          <a:blip r:embed="rId3"/>
+          <a:blip r:embed="rId3" cstate="print">
+            <a:lum/>
+          </a:blip>
           <a:srcRect/>
           <a:stretch>
             <a:fillRect/>
@@ -2946,8 +2946,8 @@
         </p:blipFill>
         <p:spPr bwMode="auto">
           <a:xfrm>
-            <a:off x="3352800" y="2914710"/>
-            <a:ext cx="685800" cy="749104"/>
+            <a:off x="4673812" y="3281086"/>
+            <a:ext cx="382283" cy="413560"/>
           </a:xfrm>
           <a:prstGeom prst="rect">
             <a:avLst/>
@@ -2964,38 +2964,14 @@
       </p:pic>
       <p:pic>
         <p:nvPicPr>
-          <p:cNvPr id="75" name="Picture 74" descr="NCIA logo.jpg"/>
-          <p:cNvPicPr>
-            <a:picLocks noChangeAspect="1"/>
-          </p:cNvPicPr>
-          <p:nvPr/>
-        </p:nvPicPr>
-        <p:blipFill>
-          <a:blip r:embed="rId4"/>
-          <a:stretch>
-            <a:fillRect/>
-          </a:stretch>
-        </p:blipFill>
-        <p:spPr>
-          <a:xfrm>
-            <a:off x="3733800" y="4057710"/>
-            <a:ext cx="1113692" cy="381000"/>
-          </a:xfrm>
-          <a:prstGeom prst="rect">
-            <a:avLst/>
-          </a:prstGeom>
-        </p:spPr>
-      </p:pic>
-      <p:pic>
-        <p:nvPicPr>
-          <p:cNvPr id="63" name="Picture 2"/>
+          <p:cNvPr id="1028" name="Picture 4"/>
           <p:cNvPicPr>
             <a:picLocks noChangeAspect="1" noChangeArrowheads="1"/>
           </p:cNvPicPr>
           <p:nvPr/>
         </p:nvPicPr>
         <p:blipFill>
-          <a:blip r:embed="rId5" cstate="print"/>
+          <a:blip r:embed="rId4"/>
           <a:srcRect/>
           <a:stretch>
             <a:fillRect/>
@@ -3003,8 +2979,8 @@
         </p:blipFill>
         <p:spPr bwMode="auto">
           <a:xfrm>
-            <a:off x="4541651" y="4514910"/>
-            <a:ext cx="411349" cy="304800"/>
+            <a:off x="3352800" y="3036332"/>
+            <a:ext cx="685800" cy="749104"/>
           </a:xfrm>
           <a:prstGeom prst="rect">
             <a:avLst/>
@@ -3021,14 +2997,38 @@
       </p:pic>
       <p:pic>
         <p:nvPicPr>
-          <p:cNvPr id="1026" name="Picture 2"/>
+          <p:cNvPr id="75" name="Picture 74" descr="NCIA logo.jpg"/>
+          <p:cNvPicPr>
+            <a:picLocks noChangeAspect="1"/>
+          </p:cNvPicPr>
+          <p:nvPr/>
+        </p:nvPicPr>
+        <p:blipFill>
+          <a:blip r:embed="rId5"/>
+          <a:stretch>
+            <a:fillRect/>
+          </a:stretch>
+        </p:blipFill>
+        <p:spPr>
+          <a:xfrm>
+            <a:off x="3733800" y="4179332"/>
+            <a:ext cx="1113692" cy="381000"/>
+          </a:xfrm>
+          <a:prstGeom prst="rect">
+            <a:avLst/>
+          </a:prstGeom>
+        </p:spPr>
+      </p:pic>
+      <p:pic>
+        <p:nvPicPr>
+          <p:cNvPr id="63" name="Picture 2"/>
           <p:cNvPicPr>
             <a:picLocks noChangeAspect="1" noChangeArrowheads="1"/>
           </p:cNvPicPr>
           <p:nvPr/>
         </p:nvPicPr>
         <p:blipFill>
-          <a:blip r:embed="rId5" cstate="print"/>
+          <a:blip r:embed="rId6" cstate="print"/>
           <a:srcRect/>
           <a:stretch>
             <a:fillRect/>
@@ -3036,7 +3036,7 @@
         </p:blipFill>
         <p:spPr bwMode="auto">
           <a:xfrm>
-            <a:off x="3962400" y="3625911"/>
+            <a:off x="4541651" y="4636532"/>
             <a:ext cx="411349" cy="304800"/>
           </a:xfrm>
           <a:prstGeom prst="rect">
@@ -3052,6 +3052,39 @@
           <a:effectLst/>
         </p:spPr>
       </p:pic>
+      <p:pic>
+        <p:nvPicPr>
+          <p:cNvPr id="1026" name="Picture 2"/>
+          <p:cNvPicPr>
+            <a:picLocks noChangeAspect="1" noChangeArrowheads="1"/>
+          </p:cNvPicPr>
+          <p:nvPr/>
+        </p:nvPicPr>
+        <p:blipFill>
+          <a:blip r:embed="rId6" cstate="print"/>
+          <a:srcRect/>
+          <a:stretch>
+            <a:fillRect/>
+          </a:stretch>
+        </p:blipFill>
+        <p:spPr bwMode="auto">
+          <a:xfrm>
+            <a:off x="3962400" y="3747533"/>
+            <a:ext cx="411349" cy="304800"/>
+          </a:xfrm>
+          <a:prstGeom prst="rect">
+            <a:avLst/>
+          </a:prstGeom>
+          <a:noFill/>
+          <a:ln w="9525">
+            <a:noFill/>
+            <a:miter lim="800000"/>
+            <a:headEnd/>
+            <a:tailEnd/>
+          </a:ln>
+          <a:effectLst/>
+        </p:spPr>
+      </p:pic>
       <p:sp>
         <p:nvSpPr>
           <p:cNvPr id="57" name="Flowchart: Magnetic Disk 56"/>
@@ -3060,7 +3093,7 @@
         </p:nvSpPr>
         <p:spPr>
           <a:xfrm>
-            <a:off x="6578598" y="2783582"/>
+            <a:off x="6578598" y="2905204"/>
             <a:ext cx="609600" cy="609600"/>
           </a:xfrm>
           <a:prstGeom prst="flowChartMagneticDisk">
@@ -3135,7 +3168,7 @@
         </p:nvSpPr>
         <p:spPr>
           <a:xfrm>
-            <a:off x="228600" y="3612178"/>
+            <a:off x="228600" y="3733800"/>
             <a:ext cx="1143000" cy="584775"/>
           </a:xfrm>
           <a:prstGeom prst="rect">
@@ -3165,7 +3198,7 @@
         </p:nvSpPr>
         <p:spPr>
           <a:xfrm>
-            <a:off x="1828800" y="3078778"/>
+            <a:off x="1828800" y="3200400"/>
             <a:ext cx="2209800" cy="338554"/>
           </a:xfrm>
           <a:prstGeom prst="rect">
@@ -3195,7 +3228,7 @@
         </p:nvSpPr>
         <p:spPr>
           <a:xfrm>
-            <a:off x="1879602" y="3625911"/>
+            <a:off x="1879602" y="3747533"/>
             <a:ext cx="1625598" cy="338554"/>
           </a:xfrm>
           <a:prstGeom prst="rect">
@@ -3225,7 +3258,7 @@
         </p:nvSpPr>
         <p:spPr>
           <a:xfrm>
-            <a:off x="2133600" y="4145578"/>
+            <a:off x="2133600" y="4267200"/>
             <a:ext cx="1524000" cy="338554"/>
           </a:xfrm>
           <a:prstGeom prst="rect">
@@ -3255,7 +3288,7 @@
         </p:nvCxnSpPr>
         <p:spPr>
           <a:xfrm flipV="1">
-            <a:off x="990600" y="3371910"/>
+            <a:off x="990600" y="3493532"/>
             <a:ext cx="762000" cy="240268"/>
           </a:xfrm>
           <a:prstGeom prst="straightConnector1">
@@ -3291,7 +3324,7 @@
         </p:nvCxnSpPr>
         <p:spPr>
           <a:xfrm flipV="1">
-            <a:off x="1143000" y="3829110"/>
+            <a:off x="1143000" y="3950732"/>
             <a:ext cx="685800" cy="11668"/>
           </a:xfrm>
           <a:prstGeom prst="straightConnector1">
@@ -3327,7 +3360,7 @@
         </p:nvCxnSpPr>
         <p:spPr>
           <a:xfrm>
-            <a:off x="990600" y="4057710"/>
+            <a:off x="990600" y="4179332"/>
             <a:ext cx="1066800" cy="240268"/>
           </a:xfrm>
           <a:prstGeom prst="straightConnector1">
@@ -3363,7 +3396,7 @@
         </p:nvSpPr>
         <p:spPr>
           <a:xfrm>
-            <a:off x="3801175" y="3603885"/>
+            <a:off x="3801175" y="3725507"/>
             <a:ext cx="739595" cy="369332"/>
           </a:xfrm>
           <a:prstGeom prst="rect">
@@ -3394,7 +3427,7 @@
         </p:nvCxnSpPr>
         <p:spPr>
           <a:xfrm>
-            <a:off x="3005665" y="3304177"/>
+            <a:off x="3005665" y="3425799"/>
             <a:ext cx="304800" cy="1588"/>
           </a:xfrm>
           <a:prstGeom prst="straightConnector1">
@@ -3430,7 +3463,7 @@
         </p:nvCxnSpPr>
         <p:spPr>
           <a:xfrm flipV="1">
-            <a:off x="3146605" y="3764578"/>
+            <a:off x="3146605" y="3886200"/>
             <a:ext cx="739595" cy="40340"/>
           </a:xfrm>
           <a:prstGeom prst="straightConnector1">
@@ -3466,7 +3499,7 @@
         </p:nvCxnSpPr>
         <p:spPr>
           <a:xfrm flipV="1">
-            <a:off x="3048000" y="4243975"/>
+            <a:off x="3048000" y="4365597"/>
             <a:ext cx="609600" cy="54003"/>
           </a:xfrm>
           <a:prstGeom prst="straightConnector1">
@@ -3502,7 +3535,7 @@
         </p:nvSpPr>
         <p:spPr>
           <a:xfrm>
-            <a:off x="1600200" y="2088178"/>
+            <a:off x="1600200" y="2209800"/>
             <a:ext cx="3352800" cy="338554"/>
           </a:xfrm>
           <a:prstGeom prst="rect">
@@ -3533,14 +3566,14 @@
           <p:nvPr/>
         </p:nvPicPr>
         <p:blipFill>
-          <a:blip r:embed="rId6" cstate="print"/>
+          <a:blip r:embed="rId7" cstate="print"/>
           <a:stretch>
             <a:fillRect/>
           </a:stretch>
         </p:blipFill>
         <p:spPr>
           <a:xfrm>
-            <a:off x="6129198" y="2381310"/>
+            <a:off x="6129198" y="2502932"/>
             <a:ext cx="830400" cy="630872"/>
           </a:xfrm>
           <a:prstGeom prst="rect">
@@ -3556,7 +3589,7 @@
         </p:nvSpPr>
         <p:spPr>
           <a:xfrm>
-            <a:off x="5808134" y="2973049"/>
+            <a:off x="5808134" y="3094671"/>
             <a:ext cx="1583266" cy="338554"/>
           </a:xfrm>
           <a:prstGeom prst="rect">
@@ -3586,7 +3619,7 @@
         </p:nvCxnSpPr>
         <p:spPr>
           <a:xfrm>
-            <a:off x="4419600" y="2316778"/>
+            <a:off x="4419600" y="2438400"/>
             <a:ext cx="1524000" cy="685800"/>
           </a:xfrm>
           <a:prstGeom prst="straightConnector1">
@@ -3622,7 +3655,7 @@
         </p:nvSpPr>
         <p:spPr>
           <a:xfrm>
-            <a:off x="7797798" y="2152710"/>
+            <a:off x="7797798" y="2274332"/>
             <a:ext cx="1143000" cy="1077218"/>
           </a:xfrm>
           <a:prstGeom prst="rect">
@@ -3660,7 +3693,7 @@
         </p:nvCxnSpPr>
         <p:spPr>
           <a:xfrm flipV="1">
-            <a:off x="7035798" y="2457510"/>
+            <a:off x="7035798" y="2579132"/>
             <a:ext cx="762000" cy="76200"/>
           </a:xfrm>
           <a:prstGeom prst="straightConnector1">
@@ -3696,7 +3729,7 @@
         </p:nvCxnSpPr>
         <p:spPr>
           <a:xfrm>
-            <a:off x="7035798" y="2686110"/>
+            <a:off x="7035798" y="2807732"/>
             <a:ext cx="762000" cy="381000"/>
           </a:xfrm>
           <a:prstGeom prst="straightConnector1">
@@ -3732,7 +3765,7 @@
         </p:nvSpPr>
         <p:spPr>
           <a:xfrm>
-            <a:off x="1676400" y="4526578"/>
+            <a:off x="1676400" y="4648200"/>
             <a:ext cx="2133600" cy="338554"/>
           </a:xfrm>
           <a:prstGeom prst="rect">
@@ -3762,7 +3795,7 @@
         </p:nvCxnSpPr>
         <p:spPr>
           <a:xfrm>
-            <a:off x="914400" y="4210110"/>
+            <a:off x="914400" y="4331732"/>
             <a:ext cx="762000" cy="381000"/>
           </a:xfrm>
           <a:prstGeom prst="straightConnector1">
@@ -3798,7 +3831,7 @@
         </p:nvCxnSpPr>
         <p:spPr>
           <a:xfrm flipV="1">
-            <a:off x="3581400" y="4629673"/>
+            <a:off x="3581400" y="4751295"/>
             <a:ext cx="888501" cy="49305"/>
           </a:xfrm>
           <a:prstGeom prst="straightConnector1">
@@ -3835,14 +3868,14 @@
           <p:nvPr/>
         </p:nvPicPr>
         <p:blipFill>
-          <a:blip r:embed="rId7" cstate="print"/>
+          <a:blip r:embed="rId8" cstate="print"/>
           <a:stretch>
             <a:fillRect/>
           </a:stretch>
         </p:blipFill>
         <p:spPr>
           <a:xfrm>
-            <a:off x="6814998" y="3295710"/>
+            <a:off x="6814998" y="3417332"/>
             <a:ext cx="629800" cy="478472"/>
           </a:xfrm>
           <a:prstGeom prst="rect">
@@ -3858,7 +3891,7 @@
         </p:nvSpPr>
         <p:spPr>
           <a:xfrm>
-            <a:off x="6536266" y="2618377"/>
+            <a:off x="6536266" y="2739999"/>
             <a:ext cx="736602" cy="400110"/>
           </a:xfrm>
           <a:prstGeom prst="rect">
@@ -3888,7 +3921,7 @@
         </p:nvSpPr>
         <p:spPr>
           <a:xfrm>
-            <a:off x="6993466" y="3541244"/>
+            <a:off x="6993466" y="3662866"/>
             <a:ext cx="838200" cy="400110"/>
           </a:xfrm>
           <a:prstGeom prst="rect">
@@ -3918,7 +3951,7 @@
         </p:nvCxnSpPr>
         <p:spPr>
           <a:xfrm rot="10800000">
-            <a:off x="7492998" y="3600510"/>
+            <a:off x="7492998" y="3722132"/>
             <a:ext cx="304800" cy="76200"/>
           </a:xfrm>
           <a:prstGeom prst="straightConnector1">
@@ -3954,7 +3987,7 @@
         </p:nvCxnSpPr>
         <p:spPr>
           <a:xfrm flipV="1">
-            <a:off x="3987801" y="3295696"/>
+            <a:off x="3987801" y="3417318"/>
             <a:ext cx="2438400" cy="42346"/>
           </a:xfrm>
           <a:prstGeom prst="straightConnector1">
@@ -3990,7 +4023,7 @@
         </p:nvCxnSpPr>
         <p:spPr>
           <a:xfrm flipV="1">
-            <a:off x="4419600" y="3371910"/>
+            <a:off x="4419600" y="3493532"/>
             <a:ext cx="2057400" cy="381000"/>
           </a:xfrm>
           <a:prstGeom prst="straightConnector1">
@@ -4026,7 +4059,7 @@
         </p:nvCxnSpPr>
         <p:spPr>
           <a:xfrm flipV="1">
-            <a:off x="4893734" y="3405775"/>
+            <a:off x="4893734" y="3527397"/>
             <a:ext cx="1701801" cy="719668"/>
           </a:xfrm>
           <a:prstGeom prst="straightConnector1">
@@ -4062,7 +4095,7 @@
         </p:nvCxnSpPr>
         <p:spPr>
           <a:xfrm flipV="1">
-            <a:off x="5029200" y="3429000"/>
+            <a:off x="5029200" y="3550622"/>
             <a:ext cx="1600200" cy="1085910"/>
           </a:xfrm>
           <a:prstGeom prst="straightConnector1">
@@ -4098,7 +4131,7 @@
         </p:nvSpPr>
         <p:spPr>
           <a:xfrm>
-            <a:off x="7797798" y="3487579"/>
+            <a:off x="7797798" y="3609201"/>
             <a:ext cx="1117602" cy="584775"/>
           </a:xfrm>
           <a:prstGeom prst="rect">
@@ -4129,7 +4162,7 @@
           <p:nvPr/>
         </p:nvPicPr>
         <p:blipFill>
-          <a:blip r:embed="rId8"/>
+          <a:blip r:embed="rId9"/>
           <a:srcRect/>
           <a:stretch>
             <a:fillRect/>
@@ -4137,7 +4170,7 @@
         </p:blipFill>
         <p:spPr bwMode="auto">
           <a:xfrm>
-            <a:off x="6429375" y="4362510"/>
+            <a:off x="6429375" y="4484132"/>
             <a:ext cx="504825" cy="566526"/>
           </a:xfrm>
           <a:prstGeom prst="rect">
@@ -4161,7 +4194,7 @@
         </p:nvCxnSpPr>
         <p:spPr>
           <a:xfrm rot="10800000">
-            <a:off x="5776210" y="4001125"/>
+            <a:off x="5776210" y="4122747"/>
             <a:ext cx="609600" cy="457200"/>
           </a:xfrm>
           <a:prstGeom prst="straightConnector1">
@@ -4197,7 +4230,7 @@
         </p:nvCxnSpPr>
         <p:spPr>
           <a:xfrm rot="10800000">
-            <a:off x="5638802" y="3524312"/>
+            <a:off x="5638802" y="3645934"/>
             <a:ext cx="914399" cy="819089"/>
           </a:xfrm>
           <a:prstGeom prst="straightConnector1">
@@ -4233,7 +4266,7 @@
         </p:nvSpPr>
         <p:spPr>
           <a:xfrm>
-            <a:off x="1866275" y="5452646"/>
+            <a:off x="1866275" y="5574268"/>
             <a:ext cx="2209800" cy="338554"/>
           </a:xfrm>
           <a:prstGeom prst="rect">
@@ -4263,7 +4296,7 @@
         </p:nvCxnSpPr>
         <p:spPr>
           <a:xfrm rot="16200000" flipH="1">
-            <a:off x="533400" y="4191000"/>
+            <a:off x="533400" y="4312622"/>
             <a:ext cx="1371600" cy="1371600"/>
           </a:xfrm>
           <a:prstGeom prst="straightConnector1">
@@ -4300,7 +4333,7 @@
           <p:nvPr/>
         </p:nvPicPr>
         <p:blipFill>
-          <a:blip r:embed="rId9"/>
+          <a:blip r:embed="rId10"/>
           <a:srcRect/>
           <a:stretch>
             <a:fillRect/>
@@ -4308,7 +4341,7 @@
         </p:blipFill>
         <p:spPr bwMode="auto">
           <a:xfrm>
-            <a:off x="4343400" y="5486400"/>
+            <a:off x="4343400" y="5608022"/>
             <a:ext cx="990600" cy="218194"/>
           </a:xfrm>
           <a:prstGeom prst="rect">
@@ -4332,7 +4365,7 @@
         </p:nvCxnSpPr>
         <p:spPr>
           <a:xfrm>
-            <a:off x="3092940" y="5637212"/>
+            <a:off x="3092940" y="5758834"/>
             <a:ext cx="1143000" cy="1588"/>
           </a:xfrm>
           <a:prstGeom prst="straightConnector1">
@@ -4368,7 +4401,7 @@
         </p:nvCxnSpPr>
         <p:spPr>
           <a:xfrm rot="5400000" flipH="1" flipV="1">
-            <a:off x="5029200" y="3810000"/>
+            <a:off x="5029200" y="3931622"/>
             <a:ext cx="2133600" cy="1371600"/>
           </a:xfrm>
           <a:prstGeom prst="straightConnector1">
@@ -4404,7 +4437,7 @@
         </p:nvSpPr>
         <p:spPr>
           <a:xfrm>
-            <a:off x="4380795" y="4488305"/>
+            <a:off x="4380795" y="4609927"/>
             <a:ext cx="739595" cy="369332"/>
           </a:xfrm>
           <a:prstGeom prst="rect">
@@ -4435,7 +4468,7 @@
         </p:nvCxnSpPr>
         <p:spPr>
           <a:xfrm>
-            <a:off x="762000" y="4267200"/>
+            <a:off x="762000" y="4388822"/>
             <a:ext cx="1143000" cy="914400"/>
           </a:xfrm>
           <a:prstGeom prst="straightConnector1">
@@ -4471,7 +4504,7 @@
         </p:nvSpPr>
         <p:spPr>
           <a:xfrm>
-            <a:off x="1905000" y="5029200"/>
+            <a:off x="1905000" y="5150822"/>
             <a:ext cx="2133600" cy="338554"/>
           </a:xfrm>
           <a:prstGeom prst="rect">
@@ -4502,14 +4535,14 @@
           <p:nvPr/>
         </p:nvPicPr>
         <p:blipFill>
-          <a:blip r:embed="rId4"/>
+          <a:blip r:embed="rId5"/>
           <a:stretch>
             <a:fillRect/>
           </a:stretch>
         </p:blipFill>
         <p:spPr>
           <a:xfrm>
-            <a:off x="4343400" y="5029200"/>
+            <a:off x="4343400" y="5150822"/>
             <a:ext cx="762000" cy="260684"/>
           </a:xfrm>
           <a:prstGeom prst="rect">
@@ -4525,7 +4558,7 @@
         </p:nvSpPr>
         <p:spPr>
           <a:xfrm>
-            <a:off x="4319665" y="5029200"/>
+            <a:off x="4319665" y="5150822"/>
             <a:ext cx="480935" cy="276999"/>
           </a:xfrm>
           <a:prstGeom prst="rect">
@@ -4559,7 +4592,7 @@
         </p:nvCxnSpPr>
         <p:spPr>
           <a:xfrm rot="5400000" flipH="1" flipV="1">
-            <a:off x="5118847" y="3491753"/>
+            <a:off x="5118847" y="3613375"/>
             <a:ext cx="1649506" cy="1524000"/>
           </a:xfrm>
           <a:prstGeom prst="straightConnector1">
@@ -4595,7 +4628,7 @@
         </p:nvCxnSpPr>
         <p:spPr>
           <a:xfrm flipV="1">
-            <a:off x="3786265" y="5181600"/>
+            <a:off x="3786265" y="5303222"/>
             <a:ext cx="480935" cy="19326"/>
           </a:xfrm>
           <a:prstGeom prst="straightConnector1">
@@ -4631,7 +4664,7 @@
         </p:nvGrpSpPr>
         <p:grpSpPr>
           <a:xfrm>
-            <a:off x="1600200" y="2618601"/>
+            <a:off x="1600200" y="2740223"/>
             <a:ext cx="3581400" cy="2318159"/>
             <a:chOff x="1600200" y="2618601"/>
             <a:chExt cx="3581400" cy="2318159"/>
@@ -4740,7 +4773,7 @@
         </p:nvGrpSpPr>
         <p:grpSpPr>
           <a:xfrm>
-            <a:off x="1752600" y="4982980"/>
+            <a:off x="1752600" y="5104602"/>
             <a:ext cx="3733800" cy="1113020"/>
             <a:chOff x="1752600" y="4982980"/>
             <a:chExt cx="3733800" cy="1113020"/>
@@ -4841,6 +4874,75 @@
           </p:txBody>
         </p:sp>
       </p:grpSp>
+      <p:pic>
+        <p:nvPicPr>
+          <p:cNvPr id="4" name="Picture 2"/>
+          <p:cNvPicPr>
+            <a:picLocks noChangeAspect="1" noChangeArrowheads="1"/>
+          </p:cNvPicPr>
+          <p:nvPr/>
+        </p:nvPicPr>
+        <p:blipFill>
+          <a:blip r:embed="rId11"/>
+          <a:srcRect/>
+          <a:stretch>
+            <a:fillRect/>
+          </a:stretch>
+        </p:blipFill>
+        <p:spPr bwMode="auto">
+          <a:xfrm>
+            <a:off x="5486400" y="1362075"/>
+            <a:ext cx="2095500" cy="390525"/>
+          </a:xfrm>
+          <a:prstGeom prst="rect">
+            <a:avLst/>
+          </a:prstGeom>
+          <a:noFill/>
+          <a:ln w="9525">
+            <a:noFill/>
+            <a:miter lim="800000"/>
+            <a:headEnd/>
+            <a:tailEnd/>
+          </a:ln>
+          <a:effectLst/>
+        </p:spPr>
+      </p:pic>
+      <p:cxnSp>
+        <p:nvCxnSpPr>
+          <p:cNvPr id="65" name="Straight Arrow Connector 64"/>
+          <p:cNvCxnSpPr/>
+          <p:nvPr/>
+        </p:nvCxnSpPr>
+        <p:spPr>
+          <a:xfrm rot="5400000" flipH="1" flipV="1">
+            <a:off x="6287294" y="2171700"/>
+            <a:ext cx="532606" cy="794"/>
+          </a:xfrm>
+          <a:prstGeom prst="straightConnector1">
+            <a:avLst/>
+          </a:prstGeom>
+          <a:ln w="12700">
+            <a:solidFill>
+              <a:schemeClr val="accent2"/>
+            </a:solidFill>
+            <a:tailEnd type="arrow"/>
+          </a:ln>
+        </p:spPr>
+        <p:style>
+          <a:lnRef idx="1">
+            <a:schemeClr val="accent1"/>
+          </a:lnRef>
+          <a:fillRef idx="0">
+            <a:schemeClr val="accent1"/>
+          </a:fillRef>
+          <a:effectRef idx="0">
+            <a:schemeClr val="accent1"/>
+          </a:effectRef>
+          <a:fontRef idx="minor">
+            <a:schemeClr val="tx1"/>
+          </a:fontRef>
+        </p:style>
+      </p:cxnSp>
     </p:spTree>
   </p:cSld>
   <p:clrMapOvr>
@@ -6095,6 +6197,105 @@
                                           </p:stCondLst>
                                         </p:cTn>
                                         <p:tgtEl>
+                                          <p:spTgt spid="4"/>
+                                        </p:tgtEl>
+                                        <p:attrNameLst>
+                                          <p:attrName>style.visibility</p:attrName>
+                                        </p:attrNameLst>
+                                      </p:cBhvr>
+                                      <p:to>
+                                        <p:strVal val="visible"/>
+                                      </p:to>
+                                    </p:set>
+                                  </p:childTnLst>
+                                </p:cTn>
+                              </p:par>
+                              <p:par>
+                                <p:cTn id="101" presetID="1" presetClass="entr" presetSubtype="0" fill="hold" nodeType="withEffect">
+                                  <p:stCondLst>
+                                    <p:cond delay="0"/>
+                                  </p:stCondLst>
+                                  <p:childTnLst>
+                                    <p:set>
+                                      <p:cBhvr>
+                                        <p:cTn id="102" dur="1" fill="hold">
+                                          <p:stCondLst>
+                                            <p:cond delay="0"/>
+                                          </p:stCondLst>
+                                        </p:cTn>
+                                        <p:tgtEl>
+                                          <p:spTgt spid="65"/>
+                                        </p:tgtEl>
+                                        <p:attrNameLst>
+                                          <p:attrName>style.visibility</p:attrName>
+                                        </p:attrNameLst>
+                                      </p:cBhvr>
+                                      <p:to>
+                                        <p:strVal val="visible"/>
+                                      </p:to>
+                                    </p:set>
+                                  </p:childTnLst>
+                                </p:cTn>
+                              </p:par>
+                              <p:par>
+                                <p:cTn id="103" presetID="1" presetClass="entr" presetSubtype="0" fill="hold" nodeType="withEffect">
+                                  <p:stCondLst>
+                                    <p:cond delay="0"/>
+                                  </p:stCondLst>
+                                  <p:childTnLst>
+                                    <p:set>
+                                      <p:cBhvr>
+                                        <p:cTn id="104" dur="1" fill="hold">
+                                          <p:stCondLst>
+                                            <p:cond delay="0"/>
+                                          </p:stCondLst>
+                                        </p:cTn>
+                                        <p:tgtEl>
+                                          <p:spTgt spid="1027"/>
+                                        </p:tgtEl>
+                                        <p:attrNameLst>
+                                          <p:attrName>style.visibility</p:attrName>
+                                        </p:attrNameLst>
+                                      </p:cBhvr>
+                                      <p:to>
+                                        <p:strVal val="visible"/>
+                                      </p:to>
+                                    </p:set>
+                                  </p:childTnLst>
+                                </p:cTn>
+                              </p:par>
+                            </p:childTnLst>
+                          </p:cTn>
+                        </p:par>
+                      </p:childTnLst>
+                    </p:cTn>
+                  </p:par>
+                  <p:par>
+                    <p:cTn id="105" fill="hold">
+                      <p:stCondLst>
+                        <p:cond delay="indefinite"/>
+                      </p:stCondLst>
+                      <p:childTnLst>
+                        <p:par>
+                          <p:cTn id="106" fill="hold">
+                            <p:stCondLst>
+                              <p:cond delay="0"/>
+                            </p:stCondLst>
+                            <p:childTnLst>
+                              <p:par>
+                                <p:cTn id="107" presetID="1" presetClass="entr" presetSubtype="0" fill="hold" nodeType="clickEffect">
+                                  <p:stCondLst>
+                                    <p:cond delay="0"/>
+                                  </p:stCondLst>
+                                  <p:childTnLst>
+                                    <p:set>
+                                      <p:cBhvr>
+                                        <p:cTn id="108" dur="1" fill="hold">
+                                          <p:stCondLst>
+                                            <p:cond delay="0"/>
+                                          </p:stCondLst>
+                                        </p:cTn>
+                                        <p:tgtEl>
                                           <p:spTgt spid="118"/>
                                         </p:tgtEl>
                                         <p:attrNameLst>
@@ -6115,26 +6316,26 @@
                     </p:cTn>
                   </p:par>
                   <p:par>
-                    <p:cTn id="101" fill="hold">
+                    <p:cTn id="109" fill="hold">
                       <p:stCondLst>
                         <p:cond delay="indefinite"/>
                       </p:stCondLst>
                       <p:childTnLst>
                         <p:par>
-                          <p:cTn id="102" fill="hold">
+                          <p:cTn id="110" fill="hold">
                             <p:stCondLst>
                               <p:cond delay="0"/>
                             </p:stCondLst>
                             <p:childTnLst>
                               <p:par>
-                                <p:cTn id="103" presetID="1" presetClass="entr" presetSubtype="0" fill="hold" nodeType="clickEffect">
+                                <p:cTn id="111" presetID="1" presetClass="entr" presetSubtype="0" fill="hold" nodeType="clickEffect">
                                   <p:stCondLst>
                                     <p:cond delay="0"/>
                                   </p:stCondLst>
                                   <p:childTnLst>
                                     <p:set>
                                       <p:cBhvr>
-                                        <p:cTn id="104" dur="1" fill="hold">
+                                        <p:cTn id="112" dur="1" fill="hold">
                                           <p:stCondLst>
                                             <p:cond delay="0"/>
                                           </p:stCondLst>
@@ -6154,14 +6355,14 @@
                                 </p:cTn>
                               </p:par>
                               <p:par>
-                                <p:cTn id="105" presetID="1" presetClass="entr" presetSubtype="0" fill="hold" nodeType="withEffect">
+                                <p:cTn id="113" presetID="1" presetClass="entr" presetSubtype="0" fill="hold" nodeType="withEffect">
                                   <p:stCondLst>
                                     <p:cond delay="0"/>
                                   </p:stCondLst>
                                   <p:childTnLst>
                                     <p:set>
                                       <p:cBhvr>
-                                        <p:cTn id="106" dur="1" fill="hold">
+                                        <p:cTn id="114" dur="1" fill="hold">
                                           <p:stCondLst>
                                             <p:cond delay="0"/>
                                           </p:stCondLst>
@@ -6181,115 +6382,7 @@
                                 </p:cTn>
                               </p:par>
                               <p:par>
-                                <p:cTn id="107" presetID="1" presetClass="entr" presetSubtype="0" fill="hold" grpId="0" nodeType="withEffect">
-                                  <p:stCondLst>
-                                    <p:cond delay="0"/>
-                                  </p:stCondLst>
-                                  <p:childTnLst>
-                                    <p:set>
-                                      <p:cBhvr>
-                                        <p:cTn id="108" dur="1" fill="hold">
-                                          <p:stCondLst>
-                                            <p:cond delay="0"/>
-                                          </p:stCondLst>
-                                        </p:cTn>
-                                        <p:tgtEl>
-                                          <p:spTgt spid="98"/>
-                                        </p:tgtEl>
-                                        <p:attrNameLst>
-                                          <p:attrName>style.visibility</p:attrName>
-                                        </p:attrNameLst>
-                                      </p:cBhvr>
-                                      <p:to>
-                                        <p:strVal val="visible"/>
-                                      </p:to>
-                                    </p:set>
-                                  </p:childTnLst>
-                                </p:cTn>
-                              </p:par>
-                              <p:par>
-                                <p:cTn id="109" presetID="1" presetClass="entr" presetSubtype="0" fill="hold" nodeType="withEffect">
-                                  <p:stCondLst>
-                                    <p:cond delay="0"/>
-                                  </p:stCondLst>
-                                  <p:childTnLst>
-                                    <p:set>
-                                      <p:cBhvr>
-                                        <p:cTn id="110" dur="1" fill="hold">
-                                          <p:stCondLst>
-                                            <p:cond delay="0"/>
-                                          </p:stCondLst>
-                                        </p:cTn>
-                                        <p:tgtEl>
-                                          <p:spTgt spid="87"/>
-                                        </p:tgtEl>
-                                        <p:attrNameLst>
-                                          <p:attrName>style.visibility</p:attrName>
-                                        </p:attrNameLst>
-                                      </p:cBhvr>
-                                      <p:to>
-                                        <p:strVal val="visible"/>
-                                      </p:to>
-                                    </p:set>
-                                  </p:childTnLst>
-                                </p:cTn>
-                              </p:par>
-                              <p:par>
-                                <p:cTn id="111" presetID="1" presetClass="entr" presetSubtype="0" fill="hold" grpId="0" nodeType="withEffect">
-                                  <p:stCondLst>
-                                    <p:cond delay="0"/>
-                                  </p:stCondLst>
-                                  <p:childTnLst>
-                                    <p:set>
-                                      <p:cBhvr>
-                                        <p:cTn id="112" dur="1" fill="hold">
-                                          <p:stCondLst>
-                                            <p:cond delay="0"/>
-                                          </p:stCondLst>
-                                        </p:cTn>
-                                        <p:tgtEl>
-                                          <p:spTgt spid="91"/>
-                                        </p:tgtEl>
-                                        <p:attrNameLst>
-                                          <p:attrName>style.visibility</p:attrName>
-                                        </p:attrNameLst>
-                                      </p:cBhvr>
-                                      <p:to>
-                                        <p:strVal val="visible"/>
-                                      </p:to>
-                                    </p:set>
-                                  </p:childTnLst>
-                                </p:cTn>
-                              </p:par>
-                              <p:par>
-                                <p:cTn id="113" presetID="1" presetClass="entr" presetSubtype="0" fill="hold" grpId="0" nodeType="withEffect">
-                                  <p:stCondLst>
-                                    <p:cond delay="0"/>
-                                  </p:stCondLst>
-                                  <p:childTnLst>
-                                    <p:set>
-                                      <p:cBhvr>
-                                        <p:cTn id="114" dur="1" fill="hold">
-                                          <p:stCondLst>
-                                            <p:cond delay="0"/>
-                                          </p:stCondLst>
-                                        </p:cTn>
-                                        <p:tgtEl>
-                                          <p:spTgt spid="105"/>
-                                        </p:tgtEl>
-                                        <p:attrNameLst>
-                                          <p:attrName>style.visibility</p:attrName>
-                                        </p:attrNameLst>
-                                      </p:cBhvr>
-                                      <p:to>
-                                        <p:strVal val="visible"/>
-                                      </p:to>
-                                    </p:set>
-                                  </p:childTnLst>
-                                </p:cTn>
-                              </p:par>
-                              <p:par>
-                                <p:cTn id="115" presetID="1" presetClass="entr" presetSubtype="0" fill="hold" nodeType="withEffect">
+                                <p:cTn id="115" presetID="1" presetClass="entr" presetSubtype="0" fill="hold" grpId="0" nodeType="withEffect">
                                   <p:stCondLst>
                                     <p:cond delay="0"/>
                                   </p:stCondLst>
@@ -6302,7 +6395,7 @@
                                           </p:stCondLst>
                                         </p:cTn>
                                         <p:tgtEl>
-                                          <p:spTgt spid="2050"/>
+                                          <p:spTgt spid="98"/>
                                         </p:tgtEl>
                                         <p:attrNameLst>
                                           <p:attrName>style.visibility</p:attrName>
@@ -6329,7 +6422,7 @@
                                           </p:stCondLst>
                                         </p:cTn>
                                         <p:tgtEl>
-                                          <p:spTgt spid="92"/>
+                                          <p:spTgt spid="87"/>
                                         </p:tgtEl>
                                         <p:attrNameLst>
                                           <p:attrName>style.visibility</p:attrName>
@@ -6343,7 +6436,7 @@
                                 </p:cTn>
                               </p:par>
                               <p:par>
-                                <p:cTn id="119" presetID="1" presetClass="entr" presetSubtype="0" fill="hold" nodeType="withEffect">
+                                <p:cTn id="119" presetID="1" presetClass="entr" presetSubtype="0" fill="hold" grpId="0" nodeType="withEffect">
                                   <p:stCondLst>
                                     <p:cond delay="0"/>
                                   </p:stCondLst>
@@ -6356,7 +6449,7 @@
                                           </p:stCondLst>
                                         </p:cTn>
                                         <p:tgtEl>
-                                          <p:spTgt spid="109"/>
+                                          <p:spTgt spid="91"/>
                                         </p:tgtEl>
                                         <p:attrNameLst>
                                           <p:attrName>style.visibility</p:attrName>
@@ -6370,7 +6463,7 @@
                                 </p:cTn>
                               </p:par>
                               <p:par>
-                                <p:cTn id="121" presetID="1" presetClass="entr" presetSubtype="0" fill="hold" nodeType="withEffect">
+                                <p:cTn id="121" presetID="1" presetClass="entr" presetSubtype="0" fill="hold" grpId="0" nodeType="withEffect">
                                   <p:stCondLst>
                                     <p:cond delay="0"/>
                                   </p:stCondLst>
@@ -6383,7 +6476,7 @@
                                           </p:stCondLst>
                                         </p:cTn>
                                         <p:tgtEl>
-                                          <p:spTgt spid="103"/>
+                                          <p:spTgt spid="105"/>
                                         </p:tgtEl>
                                         <p:attrNameLst>
                                           <p:attrName>style.visibility</p:attrName>
@@ -6410,7 +6503,7 @@
                                           </p:stCondLst>
                                         </p:cTn>
                                         <p:tgtEl>
-                                          <p:spTgt spid="97"/>
+                                          <p:spTgt spid="2050"/>
                                         </p:tgtEl>
                                         <p:attrNameLst>
                                           <p:attrName>style.visibility</p:attrName>
@@ -6437,7 +6530,7 @@
                                           </p:stCondLst>
                                         </p:cTn>
                                         <p:tgtEl>
-                                          <p:spTgt spid="107"/>
+                                          <p:spTgt spid="92"/>
                                         </p:tgtEl>
                                         <p:attrNameLst>
                                           <p:attrName>style.visibility</p:attrName>
@@ -6464,7 +6557,7 @@
                                           </p:stCondLst>
                                         </p:cTn>
                                         <p:tgtEl>
-                                          <p:spTgt spid="61"/>
+                                          <p:spTgt spid="109"/>
                                         </p:tgtEl>
                                         <p:attrNameLst>
                                           <p:attrName>style.visibility</p:attrName>
@@ -6486,6 +6579,114 @@
                                     <p:set>
                                       <p:cBhvr>
                                         <p:cTn id="130" dur="1" fill="hold">
+                                          <p:stCondLst>
+                                            <p:cond delay="0"/>
+                                          </p:stCondLst>
+                                        </p:cTn>
+                                        <p:tgtEl>
+                                          <p:spTgt spid="103"/>
+                                        </p:tgtEl>
+                                        <p:attrNameLst>
+                                          <p:attrName>style.visibility</p:attrName>
+                                        </p:attrNameLst>
+                                      </p:cBhvr>
+                                      <p:to>
+                                        <p:strVal val="visible"/>
+                                      </p:to>
+                                    </p:set>
+                                  </p:childTnLst>
+                                </p:cTn>
+                              </p:par>
+                              <p:par>
+                                <p:cTn id="131" presetID="1" presetClass="entr" presetSubtype="0" fill="hold" nodeType="withEffect">
+                                  <p:stCondLst>
+                                    <p:cond delay="0"/>
+                                  </p:stCondLst>
+                                  <p:childTnLst>
+                                    <p:set>
+                                      <p:cBhvr>
+                                        <p:cTn id="132" dur="1" fill="hold">
+                                          <p:stCondLst>
+                                            <p:cond delay="0"/>
+                                          </p:stCondLst>
+                                        </p:cTn>
+                                        <p:tgtEl>
+                                          <p:spTgt spid="97"/>
+                                        </p:tgtEl>
+                                        <p:attrNameLst>
+                                          <p:attrName>style.visibility</p:attrName>
+                                        </p:attrNameLst>
+                                      </p:cBhvr>
+                                      <p:to>
+                                        <p:strVal val="visible"/>
+                                      </p:to>
+                                    </p:set>
+                                  </p:childTnLst>
+                                </p:cTn>
+                              </p:par>
+                              <p:par>
+                                <p:cTn id="133" presetID="1" presetClass="entr" presetSubtype="0" fill="hold" nodeType="withEffect">
+                                  <p:stCondLst>
+                                    <p:cond delay="0"/>
+                                  </p:stCondLst>
+                                  <p:childTnLst>
+                                    <p:set>
+                                      <p:cBhvr>
+                                        <p:cTn id="134" dur="1" fill="hold">
+                                          <p:stCondLst>
+                                            <p:cond delay="0"/>
+                                          </p:stCondLst>
+                                        </p:cTn>
+                                        <p:tgtEl>
+                                          <p:spTgt spid="107"/>
+                                        </p:tgtEl>
+                                        <p:attrNameLst>
+                                          <p:attrName>style.visibility</p:attrName>
+                                        </p:attrNameLst>
+                                      </p:cBhvr>
+                                      <p:to>
+                                        <p:strVal val="visible"/>
+                                      </p:to>
+                                    </p:set>
+                                  </p:childTnLst>
+                                </p:cTn>
+                              </p:par>
+                              <p:par>
+                                <p:cTn id="135" presetID="1" presetClass="entr" presetSubtype="0" fill="hold" nodeType="withEffect">
+                                  <p:stCondLst>
+                                    <p:cond delay="0"/>
+                                  </p:stCondLst>
+                                  <p:childTnLst>
+                                    <p:set>
+                                      <p:cBhvr>
+                                        <p:cTn id="136" dur="1" fill="hold">
+                                          <p:stCondLst>
+                                            <p:cond delay="0"/>
+                                          </p:stCondLst>
+                                        </p:cTn>
+                                        <p:tgtEl>
+                                          <p:spTgt spid="61"/>
+                                        </p:tgtEl>
+                                        <p:attrNameLst>
+                                          <p:attrName>style.visibility</p:attrName>
+                                        </p:attrNameLst>
+                                      </p:cBhvr>
+                                      <p:to>
+                                        <p:strVal val="visible"/>
+                                      </p:to>
+                                    </p:set>
+                                  </p:childTnLst>
+                                </p:cTn>
+                              </p:par>
+                              <p:par>
+                                <p:cTn id="137" presetID="1" presetClass="entr" presetSubtype="0" fill="hold" nodeType="withEffect">
+                                  <p:stCondLst>
+                                    <p:cond delay="0"/>
+                                  </p:stCondLst>
+                                  <p:childTnLst>
+                                    <p:set>
+                                      <p:cBhvr>
+                                        <p:cTn id="138" dur="1" fill="hold">
                                           <p:stCondLst>
                                             <p:cond delay="0"/>
                                           </p:stCondLst>

</xml_diff>

<commit_message>
added caGRID analysis calls
</commit_message>
<xml_diff>
--- a/docs/project_management/external_meetings/Pre Alpha Release Intro Slides.pptx
+++ b/docs/project_management/external_meetings/Pre Alpha Release Intro Slides.pptx
@@ -2791,7 +2791,7 @@
       </p:grpSpPr>
       <p:pic>
         <p:nvPicPr>
-          <p:cNvPr id="1027" name="Picture 3"/>
+          <p:cNvPr id="66" name="Picture 2"/>
           <p:cNvPicPr>
             <a:picLocks noChangeAspect="1" noChangeArrowheads="1"/>
           </p:cNvPicPr>
@@ -2805,9 +2805,9 @@
           </a:stretch>
         </p:blipFill>
         <p:spPr bwMode="auto">
-          <a:xfrm rot="16200000">
-            <a:off x="7248525" y="971550"/>
-            <a:ext cx="619125" cy="1704975"/>
+          <a:xfrm>
+            <a:off x="3886200" y="1371600"/>
+            <a:ext cx="1226634" cy="228600"/>
           </a:xfrm>
           <a:prstGeom prst="rect">
             <a:avLst/>
@@ -2824,6 +2824,39 @@
       </p:pic>
       <p:pic>
         <p:nvPicPr>
+          <p:cNvPr id="1027" name="Picture 3"/>
+          <p:cNvPicPr>
+            <a:picLocks noChangeAspect="1" noChangeArrowheads="1"/>
+          </p:cNvPicPr>
+          <p:nvPr/>
+        </p:nvPicPr>
+        <p:blipFill>
+          <a:blip r:embed="rId3"/>
+          <a:srcRect/>
+          <a:stretch>
+            <a:fillRect/>
+          </a:stretch>
+        </p:blipFill>
+        <p:spPr bwMode="auto">
+          <a:xfrm rot="16200000">
+            <a:off x="7248525" y="971550"/>
+            <a:ext cx="619125" cy="1704975"/>
+          </a:xfrm>
+          <a:prstGeom prst="rect">
+            <a:avLst/>
+          </a:prstGeom>
+          <a:noFill/>
+          <a:ln w="9525">
+            <a:noFill/>
+            <a:miter lim="800000"/>
+            <a:headEnd/>
+            <a:tailEnd/>
+          </a:ln>
+          <a:effectLst/>
+        </p:spPr>
+      </p:pic>
+      <p:pic>
+        <p:nvPicPr>
           <p:cNvPr id="62" name="Picture 4"/>
           <p:cNvPicPr>
             <a:picLocks noChangeAspect="1" noChangeArrowheads="1"/>
@@ -2831,7 +2864,7 @@
           <p:nvPr/>
         </p:nvPicPr>
         <p:blipFill>
-          <a:blip r:embed="rId3" cstate="print">
+          <a:blip r:embed="rId4" cstate="print">
             <a:lum/>
           </a:blip>
           <a:srcRect/>
@@ -2866,7 +2899,7 @@
           <p:nvPr/>
         </p:nvPicPr>
         <p:blipFill>
-          <a:blip r:embed="rId3" cstate="print">
+          <a:blip r:embed="rId4" cstate="print">
             <a:lum/>
           </a:blip>
           <a:srcRect/>
@@ -2901,7 +2934,7 @@
           <p:nvPr/>
         </p:nvPicPr>
         <p:blipFill>
-          <a:blip r:embed="rId3" cstate="print">
+          <a:blip r:embed="rId4" cstate="print">
             <a:lum/>
           </a:blip>
           <a:srcRect/>
@@ -2936,7 +2969,7 @@
           <p:nvPr/>
         </p:nvPicPr>
         <p:blipFill>
-          <a:blip r:embed="rId3" cstate="print">
+          <a:blip r:embed="rId4" cstate="print">
             <a:lum/>
           </a:blip>
           <a:srcRect/>
@@ -2946,7 +2979,7 @@
         </p:blipFill>
         <p:spPr bwMode="auto">
           <a:xfrm>
-            <a:off x="4673812" y="3281086"/>
+            <a:off x="4876800" y="1676400"/>
             <a:ext cx="382283" cy="413560"/>
           </a:xfrm>
           <a:prstGeom prst="rect">
@@ -2971,7 +3004,7 @@
           <p:nvPr/>
         </p:nvPicPr>
         <p:blipFill>
-          <a:blip r:embed="rId4"/>
+          <a:blip r:embed="rId5"/>
           <a:srcRect/>
           <a:stretch>
             <a:fillRect/>
@@ -3004,7 +3037,7 @@
           <p:nvPr/>
         </p:nvPicPr>
         <p:blipFill>
-          <a:blip r:embed="rId5"/>
+          <a:blip r:embed="rId6"/>
           <a:stretch>
             <a:fillRect/>
           </a:stretch>
@@ -3028,7 +3061,7 @@
           <p:nvPr/>
         </p:nvPicPr>
         <p:blipFill>
-          <a:blip r:embed="rId6" cstate="print"/>
+          <a:blip r:embed="rId7" cstate="print"/>
           <a:srcRect/>
           <a:stretch>
             <a:fillRect/>
@@ -3061,7 +3094,7 @@
           <p:nvPr/>
         </p:nvPicPr>
         <p:blipFill>
-          <a:blip r:embed="rId6" cstate="print"/>
+          <a:blip r:embed="rId7" cstate="print"/>
           <a:srcRect/>
           <a:stretch>
             <a:fillRect/>
@@ -3551,7 +3584,15 @@
           <a:p>
             <a:r>
               <a:rPr lang="en-US" sz="1600" dirty="0" smtClean="0"/>
-              <a:t>Software Development Team</a:t>
+              <a:t>caIntegrator2</a:t>
+            </a:r>
+            <a:r>
+              <a:rPr lang="en-US" sz="1600" dirty="0" smtClean="0"/>
+              <a:t> </a:t>
+            </a:r>
+            <a:r>
+              <a:rPr lang="en-US" sz="1600" dirty="0" smtClean="0"/>
+              <a:t>Development Team</a:t>
             </a:r>
             <a:endParaRPr lang="en-US" sz="1600" dirty="0"/>
           </a:p>
@@ -3566,7 +3607,7 @@
           <p:nvPr/>
         </p:nvPicPr>
         <p:blipFill>
-          <a:blip r:embed="rId7" cstate="print"/>
+          <a:blip r:embed="rId8" cstate="print"/>
           <a:stretch>
             <a:fillRect/>
           </a:stretch>
@@ -3619,8 +3660,8 @@
         </p:nvCxnSpPr>
         <p:spPr>
           <a:xfrm>
-            <a:off x="4419600" y="2438400"/>
-            <a:ext cx="1524000" cy="685800"/>
+            <a:off x="4724400" y="2438400"/>
+            <a:ext cx="1219200" cy="685800"/>
           </a:xfrm>
           <a:prstGeom prst="straightConnector1">
             <a:avLst/>
@@ -3868,7 +3909,7 @@
           <p:nvPr/>
         </p:nvPicPr>
         <p:blipFill>
-          <a:blip r:embed="rId8" cstate="print"/>
+          <a:blip r:embed="rId9" cstate="print"/>
           <a:stretch>
             <a:fillRect/>
           </a:stretch>
@@ -4162,7 +4203,7 @@
           <p:nvPr/>
         </p:nvPicPr>
         <p:blipFill>
-          <a:blip r:embed="rId9"/>
+          <a:blip r:embed="rId10"/>
           <a:srcRect/>
           <a:stretch>
             <a:fillRect/>
@@ -4333,7 +4374,7 @@
           <p:nvPr/>
         </p:nvPicPr>
         <p:blipFill>
-          <a:blip r:embed="rId10"/>
+          <a:blip r:embed="rId11"/>
           <a:srcRect/>
           <a:stretch>
             <a:fillRect/>
@@ -4535,7 +4576,7 @@
           <p:nvPr/>
         </p:nvPicPr>
         <p:blipFill>
-          <a:blip r:embed="rId5"/>
+          <a:blip r:embed="rId6"/>
           <a:stretch>
             <a:fillRect/>
           </a:stretch>
@@ -4883,7 +4924,7 @@
           <p:nvPr/>
         </p:nvPicPr>
         <p:blipFill>
-          <a:blip r:embed="rId11"/>
+          <a:blip r:embed="rId2"/>
           <a:srcRect/>
           <a:stretch>
             <a:fillRect/>
@@ -4943,6 +4984,75 @@
           </a:fontRef>
         </p:style>
       </p:cxnSp>
+      <p:cxnSp>
+        <p:nvCxnSpPr>
+          <p:cNvPr id="69" name="Straight Arrow Connector 68"/>
+          <p:cNvCxnSpPr/>
+          <p:nvPr/>
+        </p:nvCxnSpPr>
+        <p:spPr>
+          <a:xfrm rot="10800000">
+            <a:off x="5309508" y="1981200"/>
+            <a:ext cx="1015092" cy="457200"/>
+          </a:xfrm>
+          <a:prstGeom prst="straightConnector1">
+            <a:avLst/>
+          </a:prstGeom>
+          <a:ln w="12700">
+            <a:solidFill>
+              <a:schemeClr val="accent2"/>
+            </a:solidFill>
+            <a:tailEnd type="arrow"/>
+          </a:ln>
+        </p:spPr>
+        <p:style>
+          <a:lnRef idx="1">
+            <a:schemeClr val="accent1"/>
+          </a:lnRef>
+          <a:fillRef idx="0">
+            <a:schemeClr val="accent1"/>
+          </a:fillRef>
+          <a:effectRef idx="0">
+            <a:schemeClr val="accent1"/>
+          </a:effectRef>
+          <a:fontRef idx="minor">
+            <a:schemeClr val="tx1"/>
+          </a:fontRef>
+        </p:style>
+      </p:cxnSp>
+      <p:pic>
+        <p:nvPicPr>
+          <p:cNvPr id="7" name="Picture 4"/>
+          <p:cNvPicPr>
+            <a:picLocks noChangeAspect="1" noChangeArrowheads="1"/>
+          </p:cNvPicPr>
+          <p:nvPr/>
+        </p:nvPicPr>
+        <p:blipFill>
+          <a:blip r:embed="rId12"/>
+          <a:srcRect/>
+          <a:stretch>
+            <a:fillRect/>
+          </a:stretch>
+        </p:blipFill>
+        <p:spPr bwMode="auto">
+          <a:xfrm>
+            <a:off x="2824856" y="1641020"/>
+            <a:ext cx="2038350" cy="314325"/>
+          </a:xfrm>
+          <a:prstGeom prst="rect">
+            <a:avLst/>
+          </a:prstGeom>
+          <a:noFill/>
+          <a:ln w="9525">
+            <a:noFill/>
+            <a:miter lim="800000"/>
+            <a:headEnd/>
+            <a:tailEnd/>
+          </a:ln>
+          <a:effectLst/>
+        </p:spPr>
+      </p:pic>
     </p:spTree>
   </p:cSld>
   <p:clrMapOvr>
@@ -5972,33 +6082,6 @@
                                           </p:stCondLst>
                                         </p:cTn>
                                         <p:tgtEl>
-                                          <p:spTgt spid="126"/>
-                                        </p:tgtEl>
-                                        <p:attrNameLst>
-                                          <p:attrName>style.visibility</p:attrName>
-                                        </p:attrNameLst>
-                                      </p:cBhvr>
-                                      <p:to>
-                                        <p:strVal val="visible"/>
-                                      </p:to>
-                                    </p:set>
-                                  </p:childTnLst>
-                                </p:cTn>
-                              </p:par>
-                              <p:par>
-                                <p:cTn id="83" presetID="1" presetClass="entr" presetSubtype="0" fill="hold" nodeType="withEffect">
-                                  <p:stCondLst>
-                                    <p:cond delay="0"/>
-                                  </p:stCondLst>
-                                  <p:childTnLst>
-                                    <p:set>
-                                      <p:cBhvr>
-                                        <p:cTn id="84" dur="1" fill="hold">
-                                          <p:stCondLst>
-                                            <p:cond delay="0"/>
-                                          </p:stCondLst>
-                                        </p:cTn>
-                                        <p:tgtEl>
                                           <p:spTgt spid="127"/>
                                         </p:tgtEl>
                                         <p:attrNameLst>
@@ -6019,19 +6102,46 @@
                     </p:cTn>
                   </p:par>
                   <p:par>
-                    <p:cTn id="85" fill="hold">
+                    <p:cTn id="83" fill="hold">
                       <p:stCondLst>
                         <p:cond delay="indefinite"/>
                       </p:stCondLst>
                       <p:childTnLst>
                         <p:par>
-                          <p:cTn id="86" fill="hold">
+                          <p:cTn id="84" fill="hold">
                             <p:stCondLst>
                               <p:cond delay="0"/>
                             </p:stCondLst>
                             <p:childTnLst>
                               <p:par>
-                                <p:cTn id="87" presetID="1" presetClass="entr" presetSubtype="0" fill="hold" grpId="0" nodeType="clickEffect">
+                                <p:cTn id="85" presetID="1" presetClass="entr" presetSubtype="0" fill="hold" grpId="0" nodeType="clickEffect">
+                                  <p:stCondLst>
+                                    <p:cond delay="0"/>
+                                  </p:stCondLst>
+                                  <p:childTnLst>
+                                    <p:set>
+                                      <p:cBhvr>
+                                        <p:cTn id="86" dur="1" fill="hold">
+                                          <p:stCondLst>
+                                            <p:cond delay="0"/>
+                                          </p:stCondLst>
+                                        </p:cTn>
+                                        <p:tgtEl>
+                                          <p:spTgt spid="78"/>
+                                        </p:tgtEl>
+                                        <p:attrNameLst>
+                                          <p:attrName>style.visibility</p:attrName>
+                                        </p:attrNameLst>
+                                      </p:cBhvr>
+                                      <p:to>
+                                        <p:strVal val="visible"/>
+                                      </p:to>
+                                    </p:set>
+                                  </p:childTnLst>
+                                </p:cTn>
+                              </p:par>
+                              <p:par>
+                                <p:cTn id="87" presetID="1" presetClass="entr" presetSubtype="0" fill="hold" nodeType="withEffect">
                                   <p:stCondLst>
                                     <p:cond delay="0"/>
                                   </p:stCondLst>
@@ -6044,7 +6154,7 @@
                                           </p:stCondLst>
                                         </p:cTn>
                                         <p:tgtEl>
-                                          <p:spTgt spid="78"/>
+                                          <p:spTgt spid="80"/>
                                         </p:tgtEl>
                                         <p:attrNameLst>
                                           <p:attrName>style.visibility</p:attrName>
@@ -6071,7 +6181,7 @@
                                           </p:stCondLst>
                                         </p:cTn>
                                         <p:tgtEl>
-                                          <p:spTgt spid="80"/>
+                                          <p:spTgt spid="79"/>
                                         </p:tgtEl>
                                         <p:attrNameLst>
                                           <p:attrName>style.visibility</p:attrName>
@@ -6098,33 +6208,6 @@
                                           </p:stCondLst>
                                         </p:cTn>
                                         <p:tgtEl>
-                                          <p:spTgt spid="79"/>
-                                        </p:tgtEl>
-                                        <p:attrNameLst>
-                                          <p:attrName>style.visibility</p:attrName>
-                                        </p:attrNameLst>
-                                      </p:cBhvr>
-                                      <p:to>
-                                        <p:strVal val="visible"/>
-                                      </p:to>
-                                    </p:set>
-                                  </p:childTnLst>
-                                </p:cTn>
-                              </p:par>
-                              <p:par>
-                                <p:cTn id="93" presetID="1" presetClass="entr" presetSubtype="0" fill="hold" nodeType="withEffect">
-                                  <p:stCondLst>
-                                    <p:cond delay="0"/>
-                                  </p:stCondLst>
-                                  <p:childTnLst>
-                                    <p:set>
-                                      <p:cBhvr>
-                                        <p:cTn id="94" dur="1" fill="hold">
-                                          <p:stCondLst>
-                                            <p:cond delay="0"/>
-                                          </p:stCondLst>
-                                        </p:cTn>
-                                        <p:tgtEl>
                                           <p:spTgt spid="56"/>
                                         </p:tgtEl>
                                         <p:attrNameLst>
@@ -6139,14 +6222,14 @@
                                 </p:cTn>
                               </p:par>
                               <p:par>
-                                <p:cTn id="95" presetID="1" presetClass="entr" presetSubtype="0" fill="hold" grpId="0" nodeType="withEffect">
+                                <p:cTn id="93" presetID="1" presetClass="entr" presetSubtype="0" fill="hold" grpId="0" nodeType="withEffect">
                                   <p:stCondLst>
                                     <p:cond delay="0"/>
                                   </p:stCondLst>
                                   <p:childTnLst>
                                     <p:set>
                                       <p:cBhvr>
-                                        <p:cTn id="96" dur="1" fill="hold">
+                                        <p:cTn id="94" dur="1" fill="hold">
                                           <p:stCondLst>
                                             <p:cond delay="0"/>
                                           </p:stCondLst>
@@ -6172,19 +6255,46 @@
                     </p:cTn>
                   </p:par>
                   <p:par>
-                    <p:cTn id="97" fill="hold">
+                    <p:cTn id="95" fill="hold">
                       <p:stCondLst>
                         <p:cond delay="indefinite"/>
                       </p:stCondLst>
                       <p:childTnLst>
                         <p:par>
-                          <p:cTn id="98" fill="hold">
+                          <p:cTn id="96" fill="hold">
                             <p:stCondLst>
                               <p:cond delay="0"/>
                             </p:stCondLst>
                             <p:childTnLst>
                               <p:par>
-                                <p:cTn id="99" presetID="1" presetClass="entr" presetSubtype="0" fill="hold" nodeType="clickEffect">
+                                <p:cTn id="97" presetID="1" presetClass="entr" presetSubtype="0" fill="hold" nodeType="clickEffect">
+                                  <p:stCondLst>
+                                    <p:cond delay="0"/>
+                                  </p:stCondLst>
+                                  <p:childTnLst>
+                                    <p:set>
+                                      <p:cBhvr>
+                                        <p:cTn id="98" dur="1" fill="hold">
+                                          <p:stCondLst>
+                                            <p:cond delay="0"/>
+                                          </p:stCondLst>
+                                        </p:cTn>
+                                        <p:tgtEl>
+                                          <p:spTgt spid="4"/>
+                                        </p:tgtEl>
+                                        <p:attrNameLst>
+                                          <p:attrName>style.visibility</p:attrName>
+                                        </p:attrNameLst>
+                                      </p:cBhvr>
+                                      <p:to>
+                                        <p:strVal val="visible"/>
+                                      </p:to>
+                                    </p:set>
+                                  </p:childTnLst>
+                                </p:cTn>
+                              </p:par>
+                              <p:par>
+                                <p:cTn id="99" presetID="1" presetClass="entr" presetSubtype="0" fill="hold" nodeType="withEffect">
                                   <p:stCondLst>
                                     <p:cond delay="0"/>
                                   </p:stCondLst>
@@ -6197,7 +6307,7 @@
                                           </p:stCondLst>
                                         </p:cTn>
                                         <p:tgtEl>
-                                          <p:spTgt spid="4"/>
+                                          <p:spTgt spid="65"/>
                                         </p:tgtEl>
                                         <p:attrNameLst>
                                           <p:attrName>style.visibility</p:attrName>
@@ -6224,7 +6334,7 @@
                                           </p:stCondLst>
                                         </p:cTn>
                                         <p:tgtEl>
-                                          <p:spTgt spid="65"/>
+                                          <p:spTgt spid="1027"/>
                                         </p:tgtEl>
                                         <p:attrNameLst>
                                           <p:attrName>style.visibility</p:attrName>
@@ -6251,7 +6361,88 @@
                                           </p:stCondLst>
                                         </p:cTn>
                                         <p:tgtEl>
-                                          <p:spTgt spid="1027"/>
+                                          <p:spTgt spid="66"/>
+                                        </p:tgtEl>
+                                        <p:attrNameLst>
+                                          <p:attrName>style.visibility</p:attrName>
+                                        </p:attrNameLst>
+                                      </p:cBhvr>
+                                      <p:to>
+                                        <p:strVal val="visible"/>
+                                      </p:to>
+                                    </p:set>
+                                  </p:childTnLst>
+                                </p:cTn>
+                              </p:par>
+                              <p:par>
+                                <p:cTn id="105" presetID="1" presetClass="entr" presetSubtype="0" fill="hold" nodeType="withEffect">
+                                  <p:stCondLst>
+                                    <p:cond delay="0"/>
+                                  </p:stCondLst>
+                                  <p:childTnLst>
+                                    <p:set>
+                                      <p:cBhvr>
+                                        <p:cTn id="106" dur="1" fill="hold">
+                                          <p:stCondLst>
+                                            <p:cond delay="0"/>
+                                          </p:stCondLst>
+                                        </p:cTn>
+                                        <p:tgtEl>
+                                          <p:spTgt spid="69"/>
+                                        </p:tgtEl>
+                                        <p:attrNameLst>
+                                          <p:attrName>style.visibility</p:attrName>
+                                        </p:attrNameLst>
+                                      </p:cBhvr>
+                                      <p:to>
+                                        <p:strVal val="visible"/>
+                                      </p:to>
+                                    </p:set>
+                                  </p:childTnLst>
+                                </p:cTn>
+                              </p:par>
+                              <p:par>
+                                <p:cTn id="107" presetID="1" presetClass="entr" presetSubtype="0" fill="hold" nodeType="withEffect">
+                                  <p:stCondLst>
+                                    <p:cond delay="0"/>
+                                  </p:stCondLst>
+                                  <p:childTnLst>
+                                    <p:set>
+                                      <p:cBhvr>
+                                        <p:cTn id="108" dur="1" fill="hold">
+                                          <p:stCondLst>
+                                            <p:cond delay="0"/>
+                                          </p:stCondLst>
+                                        </p:cTn>
+                                        <p:tgtEl>
+                                          <p:spTgt spid="7"/>
+                                        </p:tgtEl>
+                                        <p:attrNameLst>
+                                          <p:attrName>style.visibility</p:attrName>
+                                        </p:attrNameLst>
+                                      </p:cBhvr>
+                                      <p:to>
+                                        <p:strVal val="visible"/>
+                                      </p:to>
+                                    </p:set>
+                                  </p:childTnLst>
+                                </p:cTn>
+                              </p:par>
+                              <p:par>
+                                <p:cTn id="109" presetID="1" presetClass="entr" presetSubtype="0" fill="hold" nodeType="withEffect">
+                                  <p:stCondLst>
+                                    <p:cond delay="0"/>
+                                  </p:stCondLst>
+                                  <p:childTnLst>
+                                    <p:set>
+                                      <p:cBhvr>
+                                        <p:cTn id="110" dur="1" fill="hold">
+                                          <p:stCondLst>
+                                            <p:cond delay="0"/>
+                                          </p:stCondLst>
+                                        </p:cTn>
+                                        <p:tgtEl>
+                                          <p:spTgt spid="126"/>
                                         </p:tgtEl>
                                         <p:attrNameLst>
                                           <p:attrName>style.visibility</p:attrName>
@@ -6271,26 +6462,26 @@
                     </p:cTn>
                   </p:par>
                   <p:par>
-                    <p:cTn id="105" fill="hold">
+                    <p:cTn id="111" fill="hold">
                       <p:stCondLst>
                         <p:cond delay="indefinite"/>
                       </p:stCondLst>
                       <p:childTnLst>
                         <p:par>
-                          <p:cTn id="106" fill="hold">
+                          <p:cTn id="112" fill="hold">
                             <p:stCondLst>
                               <p:cond delay="0"/>
                             </p:stCondLst>
                             <p:childTnLst>
                               <p:par>
-                                <p:cTn id="107" presetID="1" presetClass="entr" presetSubtype="0" fill="hold" nodeType="clickEffect">
+                                <p:cTn id="113" presetID="1" presetClass="entr" presetSubtype="0" fill="hold" nodeType="clickEffect">
                                   <p:stCondLst>
                                     <p:cond delay="0"/>
                                   </p:stCondLst>
                                   <p:childTnLst>
                                     <p:set>
                                       <p:cBhvr>
-                                        <p:cTn id="108" dur="1" fill="hold">
+                                        <p:cTn id="114" dur="1" fill="hold">
                                           <p:stCondLst>
                                             <p:cond delay="0"/>
                                           </p:stCondLst>
@@ -6316,26 +6507,26 @@
                     </p:cTn>
                   </p:par>
                   <p:par>
-                    <p:cTn id="109" fill="hold">
+                    <p:cTn id="115" fill="hold">
                       <p:stCondLst>
                         <p:cond delay="indefinite"/>
                       </p:stCondLst>
                       <p:childTnLst>
                         <p:par>
-                          <p:cTn id="110" fill="hold">
+                          <p:cTn id="116" fill="hold">
                             <p:stCondLst>
                               <p:cond delay="0"/>
                             </p:stCondLst>
                             <p:childTnLst>
                               <p:par>
-                                <p:cTn id="111" presetID="1" presetClass="entr" presetSubtype="0" fill="hold" nodeType="clickEffect">
+                                <p:cTn id="117" presetID="1" presetClass="entr" presetSubtype="0" fill="hold" nodeType="clickEffect">
                                   <p:stCondLst>
                                     <p:cond delay="0"/>
                                   </p:stCondLst>
                                   <p:childTnLst>
                                     <p:set>
                                       <p:cBhvr>
-                                        <p:cTn id="112" dur="1" fill="hold">
+                                        <p:cTn id="118" dur="1" fill="hold">
                                           <p:stCondLst>
                                             <p:cond delay="0"/>
                                           </p:stCondLst>
@@ -6355,88 +6546,7 @@
                                 </p:cTn>
                               </p:par>
                               <p:par>
-                                <p:cTn id="113" presetID="1" presetClass="entr" presetSubtype="0" fill="hold" nodeType="withEffect">
-                                  <p:stCondLst>
-                                    <p:cond delay="0"/>
-                                  </p:stCondLst>
-                                  <p:childTnLst>
-                                    <p:set>
-                                      <p:cBhvr>
-                                        <p:cTn id="114" dur="1" fill="hold">
-                                          <p:stCondLst>
-                                            <p:cond delay="0"/>
-                                          </p:stCondLst>
-                                        </p:cTn>
-                                        <p:tgtEl>
-                                          <p:spTgt spid="101"/>
-                                        </p:tgtEl>
-                                        <p:attrNameLst>
-                                          <p:attrName>style.visibility</p:attrName>
-                                        </p:attrNameLst>
-                                      </p:cBhvr>
-                                      <p:to>
-                                        <p:strVal val="visible"/>
-                                      </p:to>
-                                    </p:set>
-                                  </p:childTnLst>
-                                </p:cTn>
-                              </p:par>
-                              <p:par>
-                                <p:cTn id="115" presetID="1" presetClass="entr" presetSubtype="0" fill="hold" grpId="0" nodeType="withEffect">
-                                  <p:stCondLst>
-                                    <p:cond delay="0"/>
-                                  </p:stCondLst>
-                                  <p:childTnLst>
-                                    <p:set>
-                                      <p:cBhvr>
-                                        <p:cTn id="116" dur="1" fill="hold">
-                                          <p:stCondLst>
-                                            <p:cond delay="0"/>
-                                          </p:stCondLst>
-                                        </p:cTn>
-                                        <p:tgtEl>
-                                          <p:spTgt spid="98"/>
-                                        </p:tgtEl>
-                                        <p:attrNameLst>
-                                          <p:attrName>style.visibility</p:attrName>
-                                        </p:attrNameLst>
-                                      </p:cBhvr>
-                                      <p:to>
-                                        <p:strVal val="visible"/>
-                                      </p:to>
-                                    </p:set>
-                                  </p:childTnLst>
-                                </p:cTn>
-                              </p:par>
-                              <p:par>
-                                <p:cTn id="117" presetID="1" presetClass="entr" presetSubtype="0" fill="hold" nodeType="withEffect">
-                                  <p:stCondLst>
-                                    <p:cond delay="0"/>
-                                  </p:stCondLst>
-                                  <p:childTnLst>
-                                    <p:set>
-                                      <p:cBhvr>
-                                        <p:cTn id="118" dur="1" fill="hold">
-                                          <p:stCondLst>
-                                            <p:cond delay="0"/>
-                                          </p:stCondLst>
-                                        </p:cTn>
-                                        <p:tgtEl>
-                                          <p:spTgt spid="87"/>
-                                        </p:tgtEl>
-                                        <p:attrNameLst>
-                                          <p:attrName>style.visibility</p:attrName>
-                                        </p:attrNameLst>
-                                      </p:cBhvr>
-                                      <p:to>
-                                        <p:strVal val="visible"/>
-                                      </p:to>
-                                    </p:set>
-                                  </p:childTnLst>
-                                </p:cTn>
-                              </p:par>
-                              <p:par>
-                                <p:cTn id="119" presetID="1" presetClass="entr" presetSubtype="0" fill="hold" grpId="0" nodeType="withEffect">
+                                <p:cTn id="119" presetID="1" presetClass="entr" presetSubtype="0" fill="hold" nodeType="withEffect">
                                   <p:stCondLst>
                                     <p:cond delay="0"/>
                                   </p:stCondLst>
@@ -6449,7 +6559,7 @@
                                           </p:stCondLst>
                                         </p:cTn>
                                         <p:tgtEl>
-                                          <p:spTgt spid="91"/>
+                                          <p:spTgt spid="101"/>
                                         </p:tgtEl>
                                         <p:attrNameLst>
                                           <p:attrName>style.visibility</p:attrName>
@@ -6476,7 +6586,7 @@
                                           </p:stCondLst>
                                         </p:cTn>
                                         <p:tgtEl>
-                                          <p:spTgt spid="105"/>
+                                          <p:spTgt spid="98"/>
                                         </p:tgtEl>
                                         <p:attrNameLst>
                                           <p:attrName>style.visibility</p:attrName>
@@ -6503,7 +6613,7 @@
                                           </p:stCondLst>
                                         </p:cTn>
                                         <p:tgtEl>
-                                          <p:spTgt spid="2050"/>
+                                          <p:spTgt spid="87"/>
                                         </p:tgtEl>
                                         <p:attrNameLst>
                                           <p:attrName>style.visibility</p:attrName>
@@ -6517,7 +6627,7 @@
                                 </p:cTn>
                               </p:par>
                               <p:par>
-                                <p:cTn id="125" presetID="1" presetClass="entr" presetSubtype="0" fill="hold" nodeType="withEffect">
+                                <p:cTn id="125" presetID="1" presetClass="entr" presetSubtype="0" fill="hold" grpId="0" nodeType="withEffect">
                                   <p:stCondLst>
                                     <p:cond delay="0"/>
                                   </p:stCondLst>
@@ -6530,7 +6640,7 @@
                                           </p:stCondLst>
                                         </p:cTn>
                                         <p:tgtEl>
-                                          <p:spTgt spid="92"/>
+                                          <p:spTgt spid="91"/>
                                         </p:tgtEl>
                                         <p:attrNameLst>
                                           <p:attrName>style.visibility</p:attrName>
@@ -6544,7 +6654,7 @@
                                 </p:cTn>
                               </p:par>
                               <p:par>
-                                <p:cTn id="127" presetID="1" presetClass="entr" presetSubtype="0" fill="hold" nodeType="withEffect">
+                                <p:cTn id="127" presetID="1" presetClass="entr" presetSubtype="0" fill="hold" grpId="0" nodeType="withEffect">
                                   <p:stCondLst>
                                     <p:cond delay="0"/>
                                   </p:stCondLst>
@@ -6557,7 +6667,7 @@
                                           </p:stCondLst>
                                         </p:cTn>
                                         <p:tgtEl>
-                                          <p:spTgt spid="109"/>
+                                          <p:spTgt spid="105"/>
                                         </p:tgtEl>
                                         <p:attrNameLst>
                                           <p:attrName>style.visibility</p:attrName>
@@ -6584,7 +6694,7 @@
                                           </p:stCondLst>
                                         </p:cTn>
                                         <p:tgtEl>
-                                          <p:spTgt spid="103"/>
+                                          <p:spTgt spid="2050"/>
                                         </p:tgtEl>
                                         <p:attrNameLst>
                                           <p:attrName>style.visibility</p:attrName>
@@ -6611,7 +6721,7 @@
                                           </p:stCondLst>
                                         </p:cTn>
                                         <p:tgtEl>
-                                          <p:spTgt spid="97"/>
+                                          <p:spTgt spid="92"/>
                                         </p:tgtEl>
                                         <p:attrNameLst>
                                           <p:attrName>style.visibility</p:attrName>
@@ -6638,7 +6748,7 @@
                                           </p:stCondLst>
                                         </p:cTn>
                                         <p:tgtEl>
-                                          <p:spTgt spid="107"/>
+                                          <p:spTgt spid="109"/>
                                         </p:tgtEl>
                                         <p:attrNameLst>
                                           <p:attrName>style.visibility</p:attrName>
@@ -6665,7 +6775,7 @@
                                           </p:stCondLst>
                                         </p:cTn>
                                         <p:tgtEl>
-                                          <p:spTgt spid="61"/>
+                                          <p:spTgt spid="103"/>
                                         </p:tgtEl>
                                         <p:attrNameLst>
                                           <p:attrName>style.visibility</p:attrName>
@@ -6687,6 +6797,87 @@
                                     <p:set>
                                       <p:cBhvr>
                                         <p:cTn id="138" dur="1" fill="hold">
+                                          <p:stCondLst>
+                                            <p:cond delay="0"/>
+                                          </p:stCondLst>
+                                        </p:cTn>
+                                        <p:tgtEl>
+                                          <p:spTgt spid="97"/>
+                                        </p:tgtEl>
+                                        <p:attrNameLst>
+                                          <p:attrName>style.visibility</p:attrName>
+                                        </p:attrNameLst>
+                                      </p:cBhvr>
+                                      <p:to>
+                                        <p:strVal val="visible"/>
+                                      </p:to>
+                                    </p:set>
+                                  </p:childTnLst>
+                                </p:cTn>
+                              </p:par>
+                              <p:par>
+                                <p:cTn id="139" presetID="1" presetClass="entr" presetSubtype="0" fill="hold" nodeType="withEffect">
+                                  <p:stCondLst>
+                                    <p:cond delay="0"/>
+                                  </p:stCondLst>
+                                  <p:childTnLst>
+                                    <p:set>
+                                      <p:cBhvr>
+                                        <p:cTn id="140" dur="1" fill="hold">
+                                          <p:stCondLst>
+                                            <p:cond delay="0"/>
+                                          </p:stCondLst>
+                                        </p:cTn>
+                                        <p:tgtEl>
+                                          <p:spTgt spid="107"/>
+                                        </p:tgtEl>
+                                        <p:attrNameLst>
+                                          <p:attrName>style.visibility</p:attrName>
+                                        </p:attrNameLst>
+                                      </p:cBhvr>
+                                      <p:to>
+                                        <p:strVal val="visible"/>
+                                      </p:to>
+                                    </p:set>
+                                  </p:childTnLst>
+                                </p:cTn>
+                              </p:par>
+                              <p:par>
+                                <p:cTn id="141" presetID="1" presetClass="entr" presetSubtype="0" fill="hold" nodeType="withEffect">
+                                  <p:stCondLst>
+                                    <p:cond delay="0"/>
+                                  </p:stCondLst>
+                                  <p:childTnLst>
+                                    <p:set>
+                                      <p:cBhvr>
+                                        <p:cTn id="142" dur="1" fill="hold">
+                                          <p:stCondLst>
+                                            <p:cond delay="0"/>
+                                          </p:stCondLst>
+                                        </p:cTn>
+                                        <p:tgtEl>
+                                          <p:spTgt spid="61"/>
+                                        </p:tgtEl>
+                                        <p:attrNameLst>
+                                          <p:attrName>style.visibility</p:attrName>
+                                        </p:attrNameLst>
+                                      </p:cBhvr>
+                                      <p:to>
+                                        <p:strVal val="visible"/>
+                                      </p:to>
+                                    </p:set>
+                                  </p:childTnLst>
+                                </p:cTn>
+                              </p:par>
+                              <p:par>
+                                <p:cTn id="143" presetID="1" presetClass="entr" presetSubtype="0" fill="hold" nodeType="withEffect">
+                                  <p:stCondLst>
+                                    <p:cond delay="0"/>
+                                  </p:stCondLst>
+                                  <p:childTnLst>
+                                    <p:set>
+                                      <p:cBhvr>
+                                        <p:cTn id="144" dur="1" fill="hold">
                                           <p:stCondLst>
                                             <p:cond delay="0"/>
                                           </p:stCondLst>

</xml_diff>

<commit_message>
made some changes in prep for doing video
</commit_message>
<xml_diff>
--- a/docs/project_management/external_meetings/Pre Alpha Release Intro Slides.pptx
+++ b/docs/project_management/external_meetings/Pre Alpha Release Intro Slides.pptx
@@ -2791,14 +2791,16 @@
       </p:grpSpPr>
       <p:pic>
         <p:nvPicPr>
-          <p:cNvPr id="66" name="Picture 2"/>
+          <p:cNvPr id="133" name="Picture 4"/>
           <p:cNvPicPr>
             <a:picLocks noChangeAspect="1" noChangeArrowheads="1"/>
           </p:cNvPicPr>
           <p:nvPr/>
         </p:nvPicPr>
         <p:blipFill>
-          <a:blip r:embed="rId2"/>
+          <a:blip r:embed="rId2" cstate="print">
+            <a:lum/>
+          </a:blip>
           <a:srcRect/>
           <a:stretch>
             <a:fillRect/>
@@ -2806,8 +2808,8 @@
         </p:blipFill>
         <p:spPr bwMode="auto">
           <a:xfrm>
-            <a:off x="3886200" y="1371600"/>
-            <a:ext cx="1226634" cy="228600"/>
+            <a:off x="5334000" y="3091640"/>
+            <a:ext cx="382283" cy="413560"/>
           </a:xfrm>
           <a:prstGeom prst="rect">
             <a:avLst/>
@@ -2824,7 +2826,7 @@
       </p:pic>
       <p:pic>
         <p:nvPicPr>
-          <p:cNvPr id="1027" name="Picture 3"/>
+          <p:cNvPr id="66" name="Picture 2"/>
           <p:cNvPicPr>
             <a:picLocks noChangeAspect="1" noChangeArrowheads="1"/>
           </p:cNvPicPr>
@@ -2838,9 +2840,9 @@
           </a:stretch>
         </p:blipFill>
         <p:spPr bwMode="auto">
-          <a:xfrm rot="16200000">
-            <a:off x="7248525" y="971550"/>
-            <a:ext cx="619125" cy="1704975"/>
+          <a:xfrm>
+            <a:off x="2890144" y="1371600"/>
+            <a:ext cx="1226634" cy="228600"/>
           </a:xfrm>
           <a:prstGeom prst="rect">
             <a:avLst/>
@@ -2857,6 +2859,39 @@
       </p:pic>
       <p:pic>
         <p:nvPicPr>
+          <p:cNvPr id="1027" name="Picture 3"/>
+          <p:cNvPicPr>
+            <a:picLocks noChangeAspect="1" noChangeArrowheads="1"/>
+          </p:cNvPicPr>
+          <p:nvPr/>
+        </p:nvPicPr>
+        <p:blipFill>
+          <a:blip r:embed="rId4"/>
+          <a:srcRect/>
+          <a:stretch>
+            <a:fillRect/>
+          </a:stretch>
+        </p:blipFill>
+        <p:spPr bwMode="auto">
+          <a:xfrm rot="16200000">
+            <a:off x="7248525" y="971550"/>
+            <a:ext cx="619125" cy="1704975"/>
+          </a:xfrm>
+          <a:prstGeom prst="rect">
+            <a:avLst/>
+          </a:prstGeom>
+          <a:noFill/>
+          <a:ln w="9525">
+            <a:noFill/>
+            <a:miter lim="800000"/>
+            <a:headEnd/>
+            <a:tailEnd/>
+          </a:ln>
+          <a:effectLst/>
+        </p:spPr>
+      </p:pic>
+      <p:pic>
+        <p:nvPicPr>
           <p:cNvPr id="62" name="Picture 4"/>
           <p:cNvPicPr>
             <a:picLocks noChangeAspect="1" noChangeArrowheads="1"/>
@@ -2864,7 +2899,7 @@
           <p:nvPr/>
         </p:nvPicPr>
         <p:blipFill>
-          <a:blip r:embed="rId4" cstate="print">
+          <a:blip r:embed="rId2" cstate="print">
             <a:lum/>
           </a:blip>
           <a:srcRect/>
@@ -2899,7 +2934,7 @@
           <p:nvPr/>
         </p:nvPicPr>
         <p:blipFill>
-          <a:blip r:embed="rId4" cstate="print">
+          <a:blip r:embed="rId2" cstate="print">
             <a:lum/>
           </a:blip>
           <a:srcRect/>
@@ -2934,7 +2969,7 @@
           <p:nvPr/>
         </p:nvPicPr>
         <p:blipFill>
-          <a:blip r:embed="rId4" cstate="print">
+          <a:blip r:embed="rId2" cstate="print">
             <a:lum/>
           </a:blip>
           <a:srcRect/>
@@ -2944,7 +2979,7 @@
         </p:blipFill>
         <p:spPr bwMode="auto">
           <a:xfrm>
-            <a:off x="5032402" y="3944470"/>
+            <a:off x="5256517" y="3657600"/>
             <a:ext cx="382283" cy="413560"/>
           </a:xfrm>
           <a:prstGeom prst="rect">
@@ -2969,7 +3004,7 @@
           <p:nvPr/>
         </p:nvPicPr>
         <p:blipFill>
-          <a:blip r:embed="rId4" cstate="print">
+          <a:blip r:embed="rId2" cstate="print">
             <a:lum/>
           </a:blip>
           <a:srcRect/>
@@ -2979,7 +3014,7 @@
         </p:blipFill>
         <p:spPr bwMode="auto">
           <a:xfrm>
-            <a:off x="4876800" y="1676400"/>
+            <a:off x="4876800" y="2024840"/>
             <a:ext cx="382283" cy="413560"/>
           </a:xfrm>
           <a:prstGeom prst="rect">
@@ -3012,7 +3047,7 @@
         </p:blipFill>
         <p:spPr bwMode="auto">
           <a:xfrm>
-            <a:off x="3352800" y="3036332"/>
+            <a:off x="3352800" y="2667000"/>
             <a:ext cx="685800" cy="749104"/>
           </a:xfrm>
           <a:prstGeom prst="rect">
@@ -3044,7 +3079,7 @@
         </p:blipFill>
         <p:spPr>
           <a:xfrm>
-            <a:off x="3733800" y="4179332"/>
+            <a:off x="3733800" y="3810000"/>
             <a:ext cx="1113692" cy="381000"/>
           </a:xfrm>
           <a:prstGeom prst="rect">
@@ -3069,7 +3104,7 @@
         </p:blipFill>
         <p:spPr bwMode="auto">
           <a:xfrm>
-            <a:off x="4541651" y="4636532"/>
+            <a:off x="4533184" y="4275667"/>
             <a:ext cx="411349" cy="304800"/>
           </a:xfrm>
           <a:prstGeom prst="rect">
@@ -3102,7 +3137,7 @@
         </p:blipFill>
         <p:spPr bwMode="auto">
           <a:xfrm>
-            <a:off x="3962400" y="3747533"/>
+            <a:off x="3953933" y="3395132"/>
             <a:ext cx="411349" cy="304800"/>
           </a:xfrm>
           <a:prstGeom prst="rect">
@@ -3231,7 +3266,7 @@
         </p:nvSpPr>
         <p:spPr>
           <a:xfrm>
-            <a:off x="1828800" y="3200400"/>
+            <a:off x="1828800" y="2831068"/>
             <a:ext cx="2209800" cy="338554"/>
           </a:xfrm>
           <a:prstGeom prst="rect">
@@ -3261,7 +3296,7 @@
         </p:nvSpPr>
         <p:spPr>
           <a:xfrm>
-            <a:off x="1879602" y="3747533"/>
+            <a:off x="1879602" y="3378201"/>
             <a:ext cx="1625598" cy="338554"/>
           </a:xfrm>
           <a:prstGeom prst="rect">
@@ -3291,7 +3326,7 @@
         </p:nvSpPr>
         <p:spPr>
           <a:xfrm>
-            <a:off x="2133600" y="4267200"/>
+            <a:off x="2133600" y="3897868"/>
             <a:ext cx="1524000" cy="338554"/>
           </a:xfrm>
           <a:prstGeom prst="rect">
@@ -3316,13 +3351,15 @@
       <p:cxnSp>
         <p:nvCxnSpPr>
           <p:cNvPr id="42" name="Straight Arrow Connector 41"/>
-          <p:cNvCxnSpPr/>
+          <p:cNvCxnSpPr>
+            <a:endCxn id="39" idx="1"/>
+          </p:cNvCxnSpPr>
           <p:nvPr/>
         </p:nvCxnSpPr>
         <p:spPr>
           <a:xfrm flipV="1">
-            <a:off x="990600" y="3493532"/>
-            <a:ext cx="762000" cy="240268"/>
+            <a:off x="914400" y="3000345"/>
+            <a:ext cx="914400" cy="885855"/>
           </a:xfrm>
           <a:prstGeom prst="straightConnector1">
             <a:avLst/>
@@ -3352,13 +3389,15 @@
       <p:cxnSp>
         <p:nvCxnSpPr>
           <p:cNvPr id="43" name="Straight Arrow Connector 42"/>
-          <p:cNvCxnSpPr/>
+          <p:cNvCxnSpPr>
+            <a:endCxn id="40" idx="1"/>
+          </p:cNvCxnSpPr>
           <p:nvPr/>
         </p:nvCxnSpPr>
         <p:spPr>
           <a:xfrm flipV="1">
-            <a:off x="1143000" y="3950732"/>
-            <a:ext cx="685800" cy="11668"/>
+            <a:off x="914400" y="3547478"/>
+            <a:ext cx="965202" cy="491122"/>
           </a:xfrm>
           <a:prstGeom prst="straightConnector1">
             <a:avLst/>
@@ -3388,13 +3427,15 @@
       <p:cxnSp>
         <p:nvCxnSpPr>
           <p:cNvPr id="44" name="Straight Arrow Connector 43"/>
-          <p:cNvCxnSpPr/>
+          <p:cNvCxnSpPr>
+            <a:endCxn id="41" idx="1"/>
+          </p:cNvCxnSpPr>
           <p:nvPr/>
         </p:nvCxnSpPr>
         <p:spPr>
-          <a:xfrm>
-            <a:off x="990600" y="4179332"/>
-            <a:ext cx="1066800" cy="240268"/>
+          <a:xfrm flipV="1">
+            <a:off x="914400" y="4067145"/>
+            <a:ext cx="1219200" cy="47655"/>
           </a:xfrm>
           <a:prstGeom prst="straightConnector1">
             <a:avLst/>
@@ -3429,7 +3470,7 @@
         </p:nvSpPr>
         <p:spPr>
           <a:xfrm>
-            <a:off x="3801175" y="3725507"/>
+            <a:off x="3801175" y="3356175"/>
             <a:ext cx="739595" cy="369332"/>
           </a:xfrm>
           <a:prstGeom prst="rect">
@@ -3460,7 +3501,7 @@
         </p:nvCxnSpPr>
         <p:spPr>
           <a:xfrm>
-            <a:off x="3005665" y="3425799"/>
+            <a:off x="3005665" y="3005668"/>
             <a:ext cx="304800" cy="1588"/>
           </a:xfrm>
           <a:prstGeom prst="straightConnector1">
@@ -3495,9 +3536,9 @@
           <p:nvPr/>
         </p:nvCxnSpPr>
         <p:spPr>
-          <a:xfrm flipV="1">
-            <a:off x="3146605" y="3886200"/>
-            <a:ext cx="739595" cy="40340"/>
+          <a:xfrm>
+            <a:off x="3183466" y="3547532"/>
+            <a:ext cx="702734" cy="1588"/>
           </a:xfrm>
           <a:prstGeom prst="straightConnector1">
             <a:avLst/>
@@ -3532,7 +3573,7 @@
         </p:nvCxnSpPr>
         <p:spPr>
           <a:xfrm flipV="1">
-            <a:off x="3048000" y="4365597"/>
+            <a:off x="3005665" y="4004732"/>
             <a:ext cx="609600" cy="54003"/>
           </a:xfrm>
           <a:prstGeom prst="straightConnector1">
@@ -3560,44 +3601,6 @@
           </a:fontRef>
         </p:style>
       </p:cxnSp>
-      <p:sp>
-        <p:nvSpPr>
-          <p:cNvPr id="55" name="TextBox 54"/>
-          <p:cNvSpPr txBox="1"/>
-          <p:nvPr/>
-        </p:nvSpPr>
-        <p:spPr>
-          <a:xfrm>
-            <a:off x="1600200" y="2209800"/>
-            <a:ext cx="3352800" cy="338554"/>
-          </a:xfrm>
-          <a:prstGeom prst="rect">
-            <a:avLst/>
-          </a:prstGeom>
-          <a:noFill/>
-        </p:spPr>
-        <p:txBody>
-          <a:bodyPr wrap="square" rtlCol="0">
-            <a:spAutoFit/>
-          </a:bodyPr>
-          <a:lstStyle/>
-          <a:p>
-            <a:r>
-              <a:rPr lang="en-US" sz="1600" dirty="0" smtClean="0"/>
-              <a:t>caIntegrator2</a:t>
-            </a:r>
-            <a:r>
-              <a:rPr lang="en-US" sz="1600" dirty="0" smtClean="0"/>
-              <a:t> </a:t>
-            </a:r>
-            <a:r>
-              <a:rPr lang="en-US" sz="1600" dirty="0" smtClean="0"/>
-              <a:t>Development Team</a:t>
-            </a:r>
-            <a:endParaRPr lang="en-US" sz="1600" dirty="0"/>
-          </a:p>
-        </p:txBody>
-      </p:sp>
       <p:pic>
         <p:nvPicPr>
           <p:cNvPr id="56" name="Picture 55" descr="2008_05_29_workspace.png"/>
@@ -3630,7 +3633,7 @@
         </p:nvSpPr>
         <p:spPr>
           <a:xfrm>
-            <a:off x="5808134" y="3094671"/>
+            <a:off x="5791200" y="3048000"/>
             <a:ext cx="1583266" cy="338554"/>
           </a:xfrm>
           <a:prstGeom prst="rect">
@@ -3652,42 +3655,6 @@
           </a:p>
         </p:txBody>
       </p:sp>
-      <p:cxnSp>
-        <p:nvCxnSpPr>
-          <p:cNvPr id="60" name="Straight Arrow Connector 59"/>
-          <p:cNvCxnSpPr/>
-          <p:nvPr/>
-        </p:nvCxnSpPr>
-        <p:spPr>
-          <a:xfrm>
-            <a:off x="4724400" y="2438400"/>
-            <a:ext cx="1219200" cy="685800"/>
-          </a:xfrm>
-          <a:prstGeom prst="straightConnector1">
-            <a:avLst/>
-          </a:prstGeom>
-          <a:ln w="12700">
-            <a:solidFill>
-              <a:schemeClr val="accent2"/>
-            </a:solidFill>
-            <a:tailEnd type="arrow"/>
-          </a:ln>
-        </p:spPr>
-        <p:style>
-          <a:lnRef idx="1">
-            <a:schemeClr val="accent1"/>
-          </a:lnRef>
-          <a:fillRef idx="0">
-            <a:schemeClr val="accent1"/>
-          </a:fillRef>
-          <a:effectRef idx="0">
-            <a:schemeClr val="accent1"/>
-          </a:effectRef>
-          <a:fontRef idx="minor">
-            <a:schemeClr val="tx1"/>
-          </a:fontRef>
-        </p:style>
-      </p:cxnSp>
       <p:sp>
         <p:nvSpPr>
           <p:cNvPr id="78" name="TextBox 77"/>
@@ -3806,7 +3773,7 @@
         </p:nvSpPr>
         <p:spPr>
           <a:xfrm>
-            <a:off x="1676400" y="4648200"/>
+            <a:off x="1676400" y="4278868"/>
             <a:ext cx="2133600" cy="338554"/>
           </a:xfrm>
           <a:prstGeom prst="rect">
@@ -3831,13 +3798,15 @@
       <p:cxnSp>
         <p:nvCxnSpPr>
           <p:cNvPr id="76" name="Straight Arrow Connector 75"/>
-          <p:cNvCxnSpPr/>
+          <p:cNvCxnSpPr>
+            <a:endCxn id="74" idx="1"/>
+          </p:cNvCxnSpPr>
           <p:nvPr/>
         </p:nvCxnSpPr>
         <p:spPr>
           <a:xfrm>
-            <a:off x="914400" y="4331732"/>
-            <a:ext cx="762000" cy="381000"/>
+            <a:off x="914400" y="4191000"/>
+            <a:ext cx="762000" cy="257145"/>
           </a:xfrm>
           <a:prstGeom prst="straightConnector1">
             <a:avLst/>
@@ -3872,7 +3841,7 @@
         </p:nvCxnSpPr>
         <p:spPr>
           <a:xfrm flipV="1">
-            <a:off x="3581400" y="4751295"/>
+            <a:off x="3539065" y="4419600"/>
             <a:ext cx="888501" cy="49305"/>
           </a:xfrm>
           <a:prstGeom prst="straightConnector1">
@@ -4023,13 +3992,15 @@
       <p:cxnSp>
         <p:nvCxnSpPr>
           <p:cNvPr id="104" name="Straight Arrow Connector 103"/>
-          <p:cNvCxnSpPr/>
+          <p:cNvCxnSpPr>
+            <a:stCxn id="39" idx="3"/>
+          </p:cNvCxnSpPr>
           <p:nvPr/>
         </p:nvCxnSpPr>
         <p:spPr>
-          <a:xfrm flipV="1">
-            <a:off x="3987801" y="3417318"/>
-            <a:ext cx="2438400" cy="42346"/>
+          <a:xfrm>
+            <a:off x="4038600" y="3000345"/>
+            <a:ext cx="2387601" cy="416973"/>
           </a:xfrm>
           <a:prstGeom prst="straightConnector1">
             <a:avLst/>
@@ -4065,7 +4036,7 @@
         <p:spPr>
           <a:xfrm flipV="1">
             <a:off x="4419600" y="3493532"/>
-            <a:ext cx="2057400" cy="381000"/>
+            <a:ext cx="2057400" cy="11668"/>
           </a:xfrm>
           <a:prstGeom prst="straightConnector1">
             <a:avLst/>
@@ -4100,8 +4071,8 @@
         </p:nvCxnSpPr>
         <p:spPr>
           <a:xfrm flipV="1">
-            <a:off x="4893734" y="3527397"/>
-            <a:ext cx="1701801" cy="719668"/>
+            <a:off x="4953000" y="3527397"/>
+            <a:ext cx="1642535" cy="435003"/>
           </a:xfrm>
           <a:prstGeom prst="straightConnector1">
             <a:avLst/>
@@ -4137,7 +4108,7 @@
         <p:spPr>
           <a:xfrm flipV="1">
             <a:off x="5029200" y="3550622"/>
-            <a:ext cx="1600200" cy="1085910"/>
+            <a:ext cx="1600200" cy="868978"/>
           </a:xfrm>
           <a:prstGeom prst="straightConnector1">
             <a:avLst/>
@@ -4211,7 +4182,7 @@
         </p:blipFill>
         <p:spPr bwMode="auto">
           <a:xfrm>
-            <a:off x="6429375" y="4484132"/>
+            <a:off x="6734175" y="4767474"/>
             <a:ext cx="504825" cy="566526"/>
           </a:xfrm>
           <a:prstGeom prst="rect">
@@ -4235,8 +4206,8 @@
         </p:nvCxnSpPr>
         <p:spPr>
           <a:xfrm rot="10800000">
-            <a:off x="5776210" y="4122747"/>
-            <a:ext cx="609600" cy="457200"/>
+            <a:off x="5715000" y="4038602"/>
+            <a:ext cx="990600" cy="761998"/>
           </a:xfrm>
           <a:prstGeom prst="straightConnector1">
             <a:avLst/>
@@ -4271,8 +4242,8 @@
         </p:nvCxnSpPr>
         <p:spPr>
           <a:xfrm rot="10800000">
-            <a:off x="5638802" y="3645934"/>
-            <a:ext cx="914399" cy="819089"/>
+            <a:off x="5562600" y="3505200"/>
+            <a:ext cx="1295400" cy="1219200"/>
           </a:xfrm>
           <a:prstGeom prst="straightConnector1">
             <a:avLst/>
@@ -4478,7 +4449,7 @@
         </p:nvSpPr>
         <p:spPr>
           <a:xfrm>
-            <a:off x="4380795" y="4609927"/>
+            <a:off x="4380795" y="4240595"/>
             <a:ext cx="739595" cy="369332"/>
           </a:xfrm>
           <a:prstGeom prst="rect">
@@ -4509,8 +4480,8 @@
         </p:nvCxnSpPr>
         <p:spPr>
           <a:xfrm>
-            <a:off x="762000" y="4388822"/>
-            <a:ext cx="1143000" cy="914400"/>
+            <a:off x="685800" y="4343402"/>
+            <a:ext cx="1219201" cy="959819"/>
           </a:xfrm>
           <a:prstGeom prst="straightConnector1">
             <a:avLst/>
@@ -4705,7 +4676,7 @@
         </p:nvGrpSpPr>
         <p:grpSpPr>
           <a:xfrm>
-            <a:off x="1600200" y="2740223"/>
+            <a:off x="1600200" y="2438400"/>
             <a:ext cx="3581400" cy="2318159"/>
             <a:chOff x="1600200" y="2618601"/>
             <a:chExt cx="3581400" cy="2318159"/>
@@ -4815,9 +4786,9 @@
         <p:grpSpPr>
           <a:xfrm>
             <a:off x="1752600" y="5104602"/>
-            <a:ext cx="3733800" cy="1113020"/>
+            <a:ext cx="3733800" cy="1143798"/>
             <a:chOff x="1752600" y="4982980"/>
-            <a:chExt cx="3733800" cy="1113020"/>
+            <a:chExt cx="3733800" cy="1143798"/>
           </a:xfrm>
         </p:grpSpPr>
         <p:sp>
@@ -4878,8 +4849,8 @@
           </p:nvSpPr>
           <p:spPr>
             <a:xfrm>
-              <a:off x="3048000" y="5819001"/>
-              <a:ext cx="1524000" cy="276999"/>
+              <a:off x="2743200" y="5849779"/>
+              <a:ext cx="1905000" cy="276999"/>
             </a:xfrm>
             <a:prstGeom prst="rect">
               <a:avLst/>
@@ -4901,7 +4872,18 @@
                     </a:schemeClr>
                   </a:solidFill>
                 </a:rPr>
-                <a:t>1.0 release</a:t>
+                <a:t>later</a:t>
+              </a:r>
+              <a:r>
+                <a:rPr lang="en-US" sz="1200" i="1" dirty="0" smtClean="0">
+                  <a:solidFill>
+                    <a:schemeClr val="accent4">
+                      <a:lumMod val="50000"/>
+                      <a:lumOff val="50000"/>
+                    </a:schemeClr>
+                  </a:solidFill>
+                </a:rPr>
+                <a:t> production releases</a:t>
               </a:r>
               <a:endParaRPr lang="en-US" sz="1200" i="1" dirty="0">
                 <a:solidFill>
@@ -4924,7 +4906,7 @@
           <p:nvPr/>
         </p:nvPicPr>
         <p:blipFill>
-          <a:blip r:embed="rId2"/>
+          <a:blip r:embed="rId3"/>
           <a:srcRect/>
           <a:stretch>
             <a:fillRect/>
@@ -4956,8 +4938,8 @@
         </p:nvCxnSpPr>
         <p:spPr>
           <a:xfrm rot="5400000" flipH="1" flipV="1">
-            <a:off x="6287294" y="2171700"/>
-            <a:ext cx="532606" cy="794"/>
+            <a:off x="6248400" y="2133600"/>
+            <a:ext cx="609600" cy="1588"/>
           </a:xfrm>
           <a:prstGeom prst="straightConnector1">
             <a:avLst/>
@@ -4992,8 +4974,8 @@
         </p:nvCxnSpPr>
         <p:spPr>
           <a:xfrm rot="10800000">
-            <a:off x="5309508" y="1981200"/>
-            <a:ext cx="1015092" cy="457200"/>
+            <a:off x="3962400" y="1752600"/>
+            <a:ext cx="2133600" cy="838200"/>
           </a:xfrm>
           <a:prstGeom prst="straightConnector1">
             <a:avLst/>
@@ -5002,6 +4984,7 @@
             <a:solidFill>
               <a:schemeClr val="accent2"/>
             </a:solidFill>
+            <a:headEnd type="arrow"/>
             <a:tailEnd type="arrow"/>
           </a:ln>
         </p:spPr>
@@ -5037,7 +5020,7 @@
         </p:blipFill>
         <p:spPr bwMode="auto">
           <a:xfrm>
-            <a:off x="2824856" y="1641020"/>
+            <a:off x="1828800" y="1641020"/>
             <a:ext cx="2038350" cy="314325"/>
           </a:xfrm>
           <a:prstGeom prst="rect">
@@ -5641,60 +5624,6 @@
                                           </p:stCondLst>
                                         </p:cTn>
                                         <p:tgtEl>
-                                          <p:spTgt spid="55"/>
-                                        </p:tgtEl>
-                                        <p:attrNameLst>
-                                          <p:attrName>style.visibility</p:attrName>
-                                        </p:attrNameLst>
-                                      </p:cBhvr>
-                                      <p:to>
-                                        <p:strVal val="visible"/>
-                                      </p:to>
-                                    </p:set>
-                                  </p:childTnLst>
-                                </p:cTn>
-                              </p:par>
-                              <p:par>
-                                <p:cTn id="49" presetID="1" presetClass="entr" presetSubtype="0" fill="hold" nodeType="withEffect">
-                                  <p:stCondLst>
-                                    <p:cond delay="0"/>
-                                  </p:stCondLst>
-                                  <p:childTnLst>
-                                    <p:set>
-                                      <p:cBhvr>
-                                        <p:cTn id="50" dur="1" fill="hold">
-                                          <p:stCondLst>
-                                            <p:cond delay="0"/>
-                                          </p:stCondLst>
-                                        </p:cTn>
-                                        <p:tgtEl>
-                                          <p:spTgt spid="60"/>
-                                        </p:tgtEl>
-                                        <p:attrNameLst>
-                                          <p:attrName>style.visibility</p:attrName>
-                                        </p:attrNameLst>
-                                      </p:cBhvr>
-                                      <p:to>
-                                        <p:strVal val="visible"/>
-                                      </p:to>
-                                    </p:set>
-                                  </p:childTnLst>
-                                </p:cTn>
-                              </p:par>
-                              <p:par>
-                                <p:cTn id="51" presetID="1" presetClass="entr" presetSubtype="0" fill="hold" grpId="0" nodeType="withEffect">
-                                  <p:stCondLst>
-                                    <p:cond delay="0"/>
-                                  </p:stCondLst>
-                                  <p:childTnLst>
-                                    <p:set>
-                                      <p:cBhvr>
-                                        <p:cTn id="52" dur="1" fill="hold">
-                                          <p:stCondLst>
-                                            <p:cond delay="0"/>
-                                          </p:stCondLst>
-                                        </p:cTn>
-                                        <p:tgtEl>
                                           <p:spTgt spid="58"/>
                                         </p:tgtEl>
                                         <p:attrNameLst>
@@ -5709,14 +5638,14 @@
                                 </p:cTn>
                               </p:par>
                               <p:par>
-                                <p:cTn id="53" presetID="1" presetClass="entr" presetSubtype="0" fill="hold" grpId="0" nodeType="withEffect">
+                                <p:cTn id="49" presetID="1" presetClass="entr" presetSubtype="0" fill="hold" grpId="0" nodeType="withEffect">
                                   <p:stCondLst>
                                     <p:cond delay="0"/>
                                   </p:stCondLst>
                                   <p:childTnLst>
                                     <p:set>
                                       <p:cBhvr>
-                                        <p:cTn id="54" dur="1" fill="hold">
+                                        <p:cTn id="50" dur="1" fill="hold">
                                           <p:stCondLst>
                                             <p:cond delay="0"/>
                                           </p:stCondLst>
@@ -5742,26 +5671,26 @@
                     </p:cTn>
                   </p:par>
                   <p:par>
-                    <p:cTn id="55" fill="hold">
+                    <p:cTn id="51" fill="hold">
                       <p:stCondLst>
                         <p:cond delay="indefinite"/>
                       </p:stCondLst>
                       <p:childTnLst>
                         <p:par>
-                          <p:cTn id="56" fill="hold">
+                          <p:cTn id="52" fill="hold">
                             <p:stCondLst>
                               <p:cond delay="0"/>
                             </p:stCondLst>
                             <p:childTnLst>
                               <p:par>
-                                <p:cTn id="57" presetID="1" presetClass="entr" presetSubtype="0" fill="hold" nodeType="clickEffect">
+                                <p:cTn id="53" presetID="1" presetClass="entr" presetSubtype="0" fill="hold" nodeType="clickEffect">
                                   <p:stCondLst>
                                     <p:cond delay="0"/>
                                   </p:stCondLst>
                                   <p:childTnLst>
                                     <p:set>
                                       <p:cBhvr>
-                                        <p:cTn id="58" dur="1" fill="hold">
+                                        <p:cTn id="54" dur="1" fill="hold">
                                           <p:stCondLst>
                                             <p:cond delay="0"/>
                                           </p:stCondLst>
@@ -5781,14 +5710,14 @@
                                 </p:cTn>
                               </p:par>
                               <p:par>
-                                <p:cTn id="59" presetID="1" presetClass="entr" presetSubtype="0" fill="hold" grpId="0" nodeType="withEffect">
+                                <p:cTn id="55" presetID="1" presetClass="entr" presetSubtype="0" fill="hold" grpId="0" nodeType="withEffect">
                                   <p:stCondLst>
                                     <p:cond delay="0"/>
                                   </p:stCondLst>
                                   <p:childTnLst>
                                     <p:set>
                                       <p:cBhvr>
-                                        <p:cTn id="60" dur="1" fill="hold">
+                                        <p:cTn id="56" dur="1" fill="hold">
                                           <p:stCondLst>
                                             <p:cond delay="0"/>
                                           </p:stCondLst>
@@ -5808,14 +5737,14 @@
                                 </p:cTn>
                               </p:par>
                               <p:par>
-                                <p:cTn id="61" presetID="1" presetClass="entr" presetSubtype="0" fill="hold" grpId="0" nodeType="withEffect">
+                                <p:cTn id="57" presetID="1" presetClass="entr" presetSubtype="0" fill="hold" grpId="0" nodeType="withEffect">
                                   <p:stCondLst>
                                     <p:cond delay="0"/>
                                   </p:stCondLst>
                                   <p:childTnLst>
                                     <p:set>
                                       <p:cBhvr>
-                                        <p:cTn id="62" dur="1" fill="hold">
+                                        <p:cTn id="58" dur="1" fill="hold">
                                           <p:stCondLst>
                                             <p:cond delay="0"/>
                                           </p:stCondLst>
@@ -5835,14 +5764,14 @@
                                 </p:cTn>
                               </p:par>
                               <p:par>
-                                <p:cTn id="63" presetID="1" presetClass="entr" presetSubtype="0" fill="hold" nodeType="withEffect">
+                                <p:cTn id="59" presetID="1" presetClass="entr" presetSubtype="0" fill="hold" nodeType="withEffect">
                                   <p:stCondLst>
                                     <p:cond delay="0"/>
                                   </p:stCondLst>
                                   <p:childTnLst>
                                     <p:set>
                                       <p:cBhvr>
-                                        <p:cTn id="64" dur="1" fill="hold">
+                                        <p:cTn id="60" dur="1" fill="hold">
                                           <p:stCondLst>
                                             <p:cond delay="0"/>
                                           </p:stCondLst>
@@ -5868,19 +5797,73 @@
                     </p:cTn>
                   </p:par>
                   <p:par>
-                    <p:cTn id="65" fill="hold">
+                    <p:cTn id="61" fill="hold">
                       <p:stCondLst>
                         <p:cond delay="indefinite"/>
                       </p:stCondLst>
                       <p:childTnLst>
                         <p:par>
-                          <p:cTn id="66" fill="hold">
+                          <p:cTn id="62" fill="hold">
                             <p:stCondLst>
                               <p:cond delay="0"/>
                             </p:stCondLst>
                             <p:childTnLst>
                               <p:par>
-                                <p:cTn id="67" presetID="1" presetClass="entr" presetSubtype="0" fill="hold" nodeType="clickEffect">
+                                <p:cTn id="63" presetID="1" presetClass="entr" presetSubtype="0" fill="hold" nodeType="clickEffect">
+                                  <p:stCondLst>
+                                    <p:cond delay="0"/>
+                                  </p:stCondLst>
+                                  <p:childTnLst>
+                                    <p:set>
+                                      <p:cBhvr>
+                                        <p:cTn id="64" dur="1" fill="hold">
+                                          <p:stCondLst>
+                                            <p:cond delay="0"/>
+                                          </p:stCondLst>
+                                        </p:cTn>
+                                        <p:tgtEl>
+                                          <p:spTgt spid="104"/>
+                                        </p:tgtEl>
+                                        <p:attrNameLst>
+                                          <p:attrName>style.visibility</p:attrName>
+                                        </p:attrNameLst>
+                                      </p:cBhvr>
+                                      <p:to>
+                                        <p:strVal val="visible"/>
+                                      </p:to>
+                                    </p:set>
+                                  </p:childTnLst>
+                                </p:cTn>
+                              </p:par>
+                              <p:par>
+                                <p:cTn id="65" presetID="1" presetClass="entr" presetSubtype="0" fill="hold" nodeType="withEffect">
+                                  <p:stCondLst>
+                                    <p:cond delay="0"/>
+                                  </p:stCondLst>
+                                  <p:childTnLst>
+                                    <p:set>
+                                      <p:cBhvr>
+                                        <p:cTn id="66" dur="1" fill="hold">
+                                          <p:stCondLst>
+                                            <p:cond delay="0"/>
+                                          </p:stCondLst>
+                                        </p:cTn>
+                                        <p:tgtEl>
+                                          <p:spTgt spid="133"/>
+                                        </p:tgtEl>
+                                        <p:attrNameLst>
+                                          <p:attrName>style.visibility</p:attrName>
+                                        </p:attrNameLst>
+                                      </p:cBhvr>
+                                      <p:to>
+                                        <p:strVal val="visible"/>
+                                      </p:to>
+                                    </p:set>
+                                  </p:childTnLst>
+                                </p:cTn>
+                              </p:par>
+                              <p:par>
+                                <p:cTn id="67" presetID="1" presetClass="entr" presetSubtype="0" fill="hold" nodeType="withEffect">
                                   <p:stCondLst>
                                     <p:cond delay="0"/>
                                   </p:stCondLst>
@@ -5893,7 +5876,7 @@
                                           </p:stCondLst>
                                         </p:cTn>
                                         <p:tgtEl>
-                                          <p:spTgt spid="104"/>
+                                          <p:spTgt spid="106"/>
                                         </p:tgtEl>
                                         <p:attrNameLst>
                                           <p:attrName>style.visibility</p:attrName>
@@ -5920,7 +5903,7 @@
                                           </p:stCondLst>
                                         </p:cTn>
                                         <p:tgtEl>
-                                          <p:spTgt spid="106"/>
+                                          <p:spTgt spid="108"/>
                                         </p:tgtEl>
                                         <p:attrNameLst>
                                           <p:attrName>style.visibility</p:attrName>
@@ -5947,7 +5930,7 @@
                                           </p:stCondLst>
                                         </p:cTn>
                                         <p:tgtEl>
-                                          <p:spTgt spid="108"/>
+                                          <p:spTgt spid="110"/>
                                         </p:tgtEl>
                                         <p:attrNameLst>
                                           <p:attrName>style.visibility</p:attrName>
@@ -5974,7 +5957,7 @@
                                           </p:stCondLst>
                                         </p:cTn>
                                         <p:tgtEl>
-                                          <p:spTgt spid="110"/>
+                                          <p:spTgt spid="72"/>
                                         </p:tgtEl>
                                         <p:attrNameLst>
                                           <p:attrName>style.visibility</p:attrName>
@@ -6001,7 +5984,7 @@
                                           </p:stCondLst>
                                         </p:cTn>
                                         <p:tgtEl>
-                                          <p:spTgt spid="72"/>
+                                          <p:spTgt spid="70"/>
                                         </p:tgtEl>
                                         <p:attrNameLst>
                                           <p:attrName>style.visibility</p:attrName>
@@ -6028,7 +6011,7 @@
                                           </p:stCondLst>
                                         </p:cTn>
                                         <p:tgtEl>
-                                          <p:spTgt spid="70"/>
+                                          <p:spTgt spid="3"/>
                                         </p:tgtEl>
                                         <p:attrNameLst>
                                           <p:attrName>style.visibility</p:attrName>
@@ -6055,33 +6038,6 @@
                                           </p:stCondLst>
                                         </p:cTn>
                                         <p:tgtEl>
-                                          <p:spTgt spid="3"/>
-                                        </p:tgtEl>
-                                        <p:attrNameLst>
-                                          <p:attrName>style.visibility</p:attrName>
-                                        </p:attrNameLst>
-                                      </p:cBhvr>
-                                      <p:to>
-                                        <p:strVal val="visible"/>
-                                      </p:to>
-                                    </p:set>
-                                  </p:childTnLst>
-                                </p:cTn>
-                              </p:par>
-                              <p:par>
-                                <p:cTn id="81" presetID="1" presetClass="entr" presetSubtype="0" fill="hold" nodeType="withEffect">
-                                  <p:stCondLst>
-                                    <p:cond delay="0"/>
-                                  </p:stCondLst>
-                                  <p:childTnLst>
-                                    <p:set>
-                                      <p:cBhvr>
-                                        <p:cTn id="82" dur="1" fill="hold">
-                                          <p:stCondLst>
-                                            <p:cond delay="0"/>
-                                          </p:stCondLst>
-                                        </p:cTn>
-                                        <p:tgtEl>
                                           <p:spTgt spid="127"/>
                                         </p:tgtEl>
                                         <p:attrNameLst>
@@ -6102,19 +6058,46 @@
                     </p:cTn>
                   </p:par>
                   <p:par>
-                    <p:cTn id="83" fill="hold">
+                    <p:cTn id="81" fill="hold">
                       <p:stCondLst>
                         <p:cond delay="indefinite"/>
                       </p:stCondLst>
                       <p:childTnLst>
                         <p:par>
-                          <p:cTn id="84" fill="hold">
+                          <p:cTn id="82" fill="hold">
                             <p:stCondLst>
                               <p:cond delay="0"/>
                             </p:stCondLst>
                             <p:childTnLst>
                               <p:par>
-                                <p:cTn id="85" presetID="1" presetClass="entr" presetSubtype="0" fill="hold" grpId="0" nodeType="clickEffect">
+                                <p:cTn id="83" presetID="1" presetClass="entr" presetSubtype="0" fill="hold" grpId="0" nodeType="clickEffect">
+                                  <p:stCondLst>
+                                    <p:cond delay="0"/>
+                                  </p:stCondLst>
+                                  <p:childTnLst>
+                                    <p:set>
+                                      <p:cBhvr>
+                                        <p:cTn id="84" dur="1" fill="hold">
+                                          <p:stCondLst>
+                                            <p:cond delay="0"/>
+                                          </p:stCondLst>
+                                        </p:cTn>
+                                        <p:tgtEl>
+                                          <p:spTgt spid="78"/>
+                                        </p:tgtEl>
+                                        <p:attrNameLst>
+                                          <p:attrName>style.visibility</p:attrName>
+                                        </p:attrNameLst>
+                                      </p:cBhvr>
+                                      <p:to>
+                                        <p:strVal val="visible"/>
+                                      </p:to>
+                                    </p:set>
+                                  </p:childTnLst>
+                                </p:cTn>
+                              </p:par>
+                              <p:par>
+                                <p:cTn id="85" presetID="1" presetClass="entr" presetSubtype="0" fill="hold" nodeType="withEffect">
                                   <p:stCondLst>
                                     <p:cond delay="0"/>
                                   </p:stCondLst>
@@ -6127,7 +6110,7 @@
                                           </p:stCondLst>
                                         </p:cTn>
                                         <p:tgtEl>
-                                          <p:spTgt spid="78"/>
+                                          <p:spTgt spid="80"/>
                                         </p:tgtEl>
                                         <p:attrNameLst>
                                           <p:attrName>style.visibility</p:attrName>
@@ -6154,7 +6137,7 @@
                                           </p:stCondLst>
                                         </p:cTn>
                                         <p:tgtEl>
-                                          <p:spTgt spid="80"/>
+                                          <p:spTgt spid="79"/>
                                         </p:tgtEl>
                                         <p:attrNameLst>
                                           <p:attrName>style.visibility</p:attrName>
@@ -6181,33 +6164,6 @@
                                           </p:stCondLst>
                                         </p:cTn>
                                         <p:tgtEl>
-                                          <p:spTgt spid="79"/>
-                                        </p:tgtEl>
-                                        <p:attrNameLst>
-                                          <p:attrName>style.visibility</p:attrName>
-                                        </p:attrNameLst>
-                                      </p:cBhvr>
-                                      <p:to>
-                                        <p:strVal val="visible"/>
-                                      </p:to>
-                                    </p:set>
-                                  </p:childTnLst>
-                                </p:cTn>
-                              </p:par>
-                              <p:par>
-                                <p:cTn id="91" presetID="1" presetClass="entr" presetSubtype="0" fill="hold" nodeType="withEffect">
-                                  <p:stCondLst>
-                                    <p:cond delay="0"/>
-                                  </p:stCondLst>
-                                  <p:childTnLst>
-                                    <p:set>
-                                      <p:cBhvr>
-                                        <p:cTn id="92" dur="1" fill="hold">
-                                          <p:stCondLst>
-                                            <p:cond delay="0"/>
-                                          </p:stCondLst>
-                                        </p:cTn>
-                                        <p:tgtEl>
                                           <p:spTgt spid="56"/>
                                         </p:tgtEl>
                                         <p:attrNameLst>
@@ -6222,14 +6178,14 @@
                                 </p:cTn>
                               </p:par>
                               <p:par>
-                                <p:cTn id="93" presetID="1" presetClass="entr" presetSubtype="0" fill="hold" grpId="0" nodeType="withEffect">
+                                <p:cTn id="91" presetID="1" presetClass="entr" presetSubtype="0" fill="hold" grpId="0" nodeType="withEffect">
                                   <p:stCondLst>
                                     <p:cond delay="0"/>
                                   </p:stCondLst>
                                   <p:childTnLst>
                                     <p:set>
                                       <p:cBhvr>
-                                        <p:cTn id="94" dur="1" fill="hold">
+                                        <p:cTn id="92" dur="1" fill="hold">
                                           <p:stCondLst>
                                             <p:cond delay="0"/>
                                           </p:stCondLst>
@@ -6255,19 +6211,46 @@
                     </p:cTn>
                   </p:par>
                   <p:par>
-                    <p:cTn id="95" fill="hold">
+                    <p:cTn id="93" fill="hold">
                       <p:stCondLst>
                         <p:cond delay="indefinite"/>
                       </p:stCondLst>
                       <p:childTnLst>
                         <p:par>
-                          <p:cTn id="96" fill="hold">
+                          <p:cTn id="94" fill="hold">
                             <p:stCondLst>
                               <p:cond delay="0"/>
                             </p:stCondLst>
                             <p:childTnLst>
                               <p:par>
-                                <p:cTn id="97" presetID="1" presetClass="entr" presetSubtype="0" fill="hold" nodeType="clickEffect">
+                                <p:cTn id="95" presetID="1" presetClass="entr" presetSubtype="0" fill="hold" nodeType="clickEffect">
+                                  <p:stCondLst>
+                                    <p:cond delay="0"/>
+                                  </p:stCondLst>
+                                  <p:childTnLst>
+                                    <p:set>
+                                      <p:cBhvr>
+                                        <p:cTn id="96" dur="1" fill="hold">
+                                          <p:stCondLst>
+                                            <p:cond delay="0"/>
+                                          </p:stCondLst>
+                                        </p:cTn>
+                                        <p:tgtEl>
+                                          <p:spTgt spid="4"/>
+                                        </p:tgtEl>
+                                        <p:attrNameLst>
+                                          <p:attrName>style.visibility</p:attrName>
+                                        </p:attrNameLst>
+                                      </p:cBhvr>
+                                      <p:to>
+                                        <p:strVal val="visible"/>
+                                      </p:to>
+                                    </p:set>
+                                  </p:childTnLst>
+                                </p:cTn>
+                              </p:par>
+                              <p:par>
+                                <p:cTn id="97" presetID="1" presetClass="entr" presetSubtype="0" fill="hold" nodeType="withEffect">
                                   <p:stCondLst>
                                     <p:cond delay="0"/>
                                   </p:stCondLst>
@@ -6280,7 +6263,7 @@
                                           </p:stCondLst>
                                         </p:cTn>
                                         <p:tgtEl>
-                                          <p:spTgt spid="4"/>
+                                          <p:spTgt spid="65"/>
                                         </p:tgtEl>
                                         <p:attrNameLst>
                                           <p:attrName>style.visibility</p:attrName>
@@ -6307,7 +6290,7 @@
                                           </p:stCondLst>
                                         </p:cTn>
                                         <p:tgtEl>
-                                          <p:spTgt spid="65"/>
+                                          <p:spTgt spid="1027"/>
                                         </p:tgtEl>
                                         <p:attrNameLst>
                                           <p:attrName>style.visibility</p:attrName>
@@ -6334,7 +6317,7 @@
                                           </p:stCondLst>
                                         </p:cTn>
                                         <p:tgtEl>
-                                          <p:spTgt spid="1027"/>
+                                          <p:spTgt spid="66"/>
                                         </p:tgtEl>
                                         <p:attrNameLst>
                                           <p:attrName>style.visibility</p:attrName>
@@ -6361,7 +6344,7 @@
                                           </p:stCondLst>
                                         </p:cTn>
                                         <p:tgtEl>
-                                          <p:spTgt spid="66"/>
+                                          <p:spTgt spid="69"/>
                                         </p:tgtEl>
                                         <p:attrNameLst>
                                           <p:attrName>style.visibility</p:attrName>
@@ -6388,7 +6371,7 @@
                                           </p:stCondLst>
                                         </p:cTn>
                                         <p:tgtEl>
-                                          <p:spTgt spid="69"/>
+                                          <p:spTgt spid="7"/>
                                         </p:tgtEl>
                                         <p:attrNameLst>
                                           <p:attrName>style.visibility</p:attrName>
@@ -6415,33 +6398,6 @@
                                           </p:stCondLst>
                                         </p:cTn>
                                         <p:tgtEl>
-                                          <p:spTgt spid="7"/>
-                                        </p:tgtEl>
-                                        <p:attrNameLst>
-                                          <p:attrName>style.visibility</p:attrName>
-                                        </p:attrNameLst>
-                                      </p:cBhvr>
-                                      <p:to>
-                                        <p:strVal val="visible"/>
-                                      </p:to>
-                                    </p:set>
-                                  </p:childTnLst>
-                                </p:cTn>
-                              </p:par>
-                              <p:par>
-                                <p:cTn id="109" presetID="1" presetClass="entr" presetSubtype="0" fill="hold" nodeType="withEffect">
-                                  <p:stCondLst>
-                                    <p:cond delay="0"/>
-                                  </p:stCondLst>
-                                  <p:childTnLst>
-                                    <p:set>
-                                      <p:cBhvr>
-                                        <p:cTn id="110" dur="1" fill="hold">
-                                          <p:stCondLst>
-                                            <p:cond delay="0"/>
-                                          </p:stCondLst>
-                                        </p:cTn>
-                                        <p:tgtEl>
                                           <p:spTgt spid="126"/>
                                         </p:tgtEl>
                                         <p:attrNameLst>
@@ -6462,26 +6418,26 @@
                     </p:cTn>
                   </p:par>
                   <p:par>
-                    <p:cTn id="111" fill="hold">
+                    <p:cTn id="109" fill="hold">
                       <p:stCondLst>
                         <p:cond delay="indefinite"/>
                       </p:stCondLst>
                       <p:childTnLst>
                         <p:par>
-                          <p:cTn id="112" fill="hold">
+                          <p:cTn id="110" fill="hold">
                             <p:stCondLst>
                               <p:cond delay="0"/>
                             </p:stCondLst>
                             <p:childTnLst>
                               <p:par>
-                                <p:cTn id="113" presetID="1" presetClass="entr" presetSubtype="0" fill="hold" nodeType="clickEffect">
+                                <p:cTn id="111" presetID="1" presetClass="entr" presetSubtype="0" fill="hold" nodeType="clickEffect">
                                   <p:stCondLst>
                                     <p:cond delay="0"/>
                                   </p:stCondLst>
                                   <p:childTnLst>
                                     <p:set>
                                       <p:cBhvr>
-                                        <p:cTn id="114" dur="1" fill="hold">
+                                        <p:cTn id="112" dur="1" fill="hold">
                                           <p:stCondLst>
                                             <p:cond delay="0"/>
                                           </p:stCondLst>
@@ -6507,26 +6463,26 @@
                     </p:cTn>
                   </p:par>
                   <p:par>
-                    <p:cTn id="115" fill="hold">
+                    <p:cTn id="113" fill="hold">
                       <p:stCondLst>
                         <p:cond delay="indefinite"/>
                       </p:stCondLst>
                       <p:childTnLst>
                         <p:par>
-                          <p:cTn id="116" fill="hold">
+                          <p:cTn id="114" fill="hold">
                             <p:stCondLst>
                               <p:cond delay="0"/>
                             </p:stCondLst>
                             <p:childTnLst>
                               <p:par>
-                                <p:cTn id="117" presetID="1" presetClass="entr" presetSubtype="0" fill="hold" nodeType="clickEffect">
+                                <p:cTn id="115" presetID="1" presetClass="entr" presetSubtype="0" fill="hold" nodeType="clickEffect">
                                   <p:stCondLst>
                                     <p:cond delay="0"/>
                                   </p:stCondLst>
                                   <p:childTnLst>
                                     <p:set>
                                       <p:cBhvr>
-                                        <p:cTn id="118" dur="1" fill="hold">
+                                        <p:cTn id="116" dur="1" fill="hold">
                                           <p:stCondLst>
                                             <p:cond delay="0"/>
                                           </p:stCondLst>
@@ -6546,14 +6502,14 @@
                                 </p:cTn>
                               </p:par>
                               <p:par>
-                                <p:cTn id="119" presetID="1" presetClass="entr" presetSubtype="0" fill="hold" nodeType="withEffect">
+                                <p:cTn id="117" presetID="1" presetClass="entr" presetSubtype="0" fill="hold" nodeType="withEffect">
                                   <p:stCondLst>
                                     <p:cond delay="0"/>
                                   </p:stCondLst>
                                   <p:childTnLst>
                                     <p:set>
                                       <p:cBhvr>
-                                        <p:cTn id="120" dur="1" fill="hold">
+                                        <p:cTn id="118" dur="1" fill="hold">
                                           <p:stCondLst>
                                             <p:cond delay="0"/>
                                           </p:stCondLst>
@@ -6573,14 +6529,14 @@
                                 </p:cTn>
                               </p:par>
                               <p:par>
-                                <p:cTn id="121" presetID="1" presetClass="entr" presetSubtype="0" fill="hold" grpId="0" nodeType="withEffect">
+                                <p:cTn id="119" presetID="1" presetClass="entr" presetSubtype="0" fill="hold" grpId="0" nodeType="withEffect">
                                   <p:stCondLst>
                                     <p:cond delay="0"/>
                                   </p:stCondLst>
                                   <p:childTnLst>
                                     <p:set>
                                       <p:cBhvr>
-                                        <p:cTn id="122" dur="1" fill="hold">
+                                        <p:cTn id="120" dur="1" fill="hold">
                                           <p:stCondLst>
                                             <p:cond delay="0"/>
                                           </p:stCondLst>
@@ -6600,7 +6556,34 @@
                                 </p:cTn>
                               </p:par>
                               <p:par>
-                                <p:cTn id="123" presetID="1" presetClass="entr" presetSubtype="0" fill="hold" nodeType="withEffect">
+                                <p:cTn id="121" presetID="1" presetClass="entr" presetSubtype="0" fill="hold" nodeType="withEffect">
+                                  <p:stCondLst>
+                                    <p:cond delay="0"/>
+                                  </p:stCondLst>
+                                  <p:childTnLst>
+                                    <p:set>
+                                      <p:cBhvr>
+                                        <p:cTn id="122" dur="1" fill="hold">
+                                          <p:stCondLst>
+                                            <p:cond delay="0"/>
+                                          </p:stCondLst>
+                                        </p:cTn>
+                                        <p:tgtEl>
+                                          <p:spTgt spid="87"/>
+                                        </p:tgtEl>
+                                        <p:attrNameLst>
+                                          <p:attrName>style.visibility</p:attrName>
+                                        </p:attrNameLst>
+                                      </p:cBhvr>
+                                      <p:to>
+                                        <p:strVal val="visible"/>
+                                      </p:to>
+                                    </p:set>
+                                  </p:childTnLst>
+                                </p:cTn>
+                              </p:par>
+                              <p:par>
+                                <p:cTn id="123" presetID="1" presetClass="entr" presetSubtype="0" fill="hold" grpId="0" nodeType="withEffect">
                                   <p:stCondLst>
                                     <p:cond delay="0"/>
                                   </p:stCondLst>
@@ -6613,7 +6596,7 @@
                                           </p:stCondLst>
                                         </p:cTn>
                                         <p:tgtEl>
-                                          <p:spTgt spid="87"/>
+                                          <p:spTgt spid="91"/>
                                         </p:tgtEl>
                                         <p:attrNameLst>
                                           <p:attrName>style.visibility</p:attrName>
@@ -6640,7 +6623,7 @@
                                           </p:stCondLst>
                                         </p:cTn>
                                         <p:tgtEl>
-                                          <p:spTgt spid="91"/>
+                                          <p:spTgt spid="105"/>
                                         </p:tgtEl>
                                         <p:attrNameLst>
                                           <p:attrName>style.visibility</p:attrName>
@@ -6654,7 +6637,7 @@
                                 </p:cTn>
                               </p:par>
                               <p:par>
-                                <p:cTn id="127" presetID="1" presetClass="entr" presetSubtype="0" fill="hold" grpId="0" nodeType="withEffect">
+                                <p:cTn id="127" presetID="1" presetClass="entr" presetSubtype="0" fill="hold" nodeType="withEffect">
                                   <p:stCondLst>
                                     <p:cond delay="0"/>
                                   </p:stCondLst>
@@ -6667,7 +6650,7 @@
                                           </p:stCondLst>
                                         </p:cTn>
                                         <p:tgtEl>
-                                          <p:spTgt spid="105"/>
+                                          <p:spTgt spid="2050"/>
                                         </p:tgtEl>
                                         <p:attrNameLst>
                                           <p:attrName>style.visibility</p:attrName>
@@ -6694,7 +6677,7 @@
                                           </p:stCondLst>
                                         </p:cTn>
                                         <p:tgtEl>
-                                          <p:spTgt spid="2050"/>
+                                          <p:spTgt spid="92"/>
                                         </p:tgtEl>
                                         <p:attrNameLst>
                                           <p:attrName>style.visibility</p:attrName>
@@ -6721,7 +6704,7 @@
                                           </p:stCondLst>
                                         </p:cTn>
                                         <p:tgtEl>
-                                          <p:spTgt spid="92"/>
+                                          <p:spTgt spid="109"/>
                                         </p:tgtEl>
                                         <p:attrNameLst>
                                           <p:attrName>style.visibility</p:attrName>
@@ -6748,7 +6731,7 @@
                                           </p:stCondLst>
                                         </p:cTn>
                                         <p:tgtEl>
-                                          <p:spTgt spid="109"/>
+                                          <p:spTgt spid="103"/>
                                         </p:tgtEl>
                                         <p:attrNameLst>
                                           <p:attrName>style.visibility</p:attrName>
@@ -6775,7 +6758,7 @@
                                           </p:stCondLst>
                                         </p:cTn>
                                         <p:tgtEl>
-                                          <p:spTgt spid="103"/>
+                                          <p:spTgt spid="97"/>
                                         </p:tgtEl>
                                         <p:attrNameLst>
                                           <p:attrName>style.visibility</p:attrName>
@@ -6802,7 +6785,7 @@
                                           </p:stCondLst>
                                         </p:cTn>
                                         <p:tgtEl>
-                                          <p:spTgt spid="97"/>
+                                          <p:spTgt spid="107"/>
                                         </p:tgtEl>
                                         <p:attrNameLst>
                                           <p:attrName>style.visibility</p:attrName>
@@ -6829,7 +6812,7 @@
                                           </p:stCondLst>
                                         </p:cTn>
                                         <p:tgtEl>
-                                          <p:spTgt spid="107"/>
+                                          <p:spTgt spid="61"/>
                                         </p:tgtEl>
                                         <p:attrNameLst>
                                           <p:attrName>style.visibility</p:attrName>
@@ -6851,33 +6834,6 @@
                                     <p:set>
                                       <p:cBhvr>
                                         <p:cTn id="142" dur="1" fill="hold">
-                                          <p:stCondLst>
-                                            <p:cond delay="0"/>
-                                          </p:stCondLst>
-                                        </p:cTn>
-                                        <p:tgtEl>
-                                          <p:spTgt spid="61"/>
-                                        </p:tgtEl>
-                                        <p:attrNameLst>
-                                          <p:attrName>style.visibility</p:attrName>
-                                        </p:attrNameLst>
-                                      </p:cBhvr>
-                                      <p:to>
-                                        <p:strVal val="visible"/>
-                                      </p:to>
-                                    </p:set>
-                                  </p:childTnLst>
-                                </p:cTn>
-                              </p:par>
-                              <p:par>
-                                <p:cTn id="143" presetID="1" presetClass="entr" presetSubtype="0" fill="hold" nodeType="withEffect">
-                                  <p:stCondLst>
-                                    <p:cond delay="0"/>
-                                  </p:stCondLst>
-                                  <p:childTnLst>
-                                    <p:set>
-                                      <p:cBhvr>
-                                        <p:cTn id="144" dur="1" fill="hold">
                                           <p:stCondLst>
                                             <p:cond delay="0"/>
                                           </p:stCondLst>
@@ -6930,7 +6886,6 @@
       <p:bldP spid="40" grpId="0"/>
       <p:bldP spid="41" grpId="0"/>
       <p:bldP spid="47" grpId="0"/>
-      <p:bldP spid="55" grpId="0"/>
       <p:bldP spid="58" grpId="0"/>
       <p:bldP spid="78" grpId="0"/>
       <p:bldP spid="74" grpId="0"/>

</xml_diff>